<commit_message>
TS Tutorial md update
</commit_message>
<xml_diff>
--- a/Students/siddharthajit/Tutorial Presentation/Thompson Sampling.pptx
+++ b/Students/siddharthajit/Tutorial Presentation/Thompson Sampling.pptx
@@ -5,26 +5,25 @@
     <p:sldMasterId id="2147483660" r:id="rId1"/>
   </p:sldMasterIdLst>
   <p:notesMasterIdLst>
-    <p:notesMasterId r:id="rId19"/>
+    <p:notesMasterId r:id="rId18"/>
   </p:notesMasterIdLst>
   <p:sldIdLst>
     <p:sldId id="256" r:id="rId2"/>
     <p:sldId id="257" r:id="rId3"/>
     <p:sldId id="267" r:id="rId4"/>
     <p:sldId id="268" r:id="rId5"/>
-    <p:sldId id="274" r:id="rId6"/>
-    <p:sldId id="270" r:id="rId7"/>
-    <p:sldId id="269" r:id="rId8"/>
-    <p:sldId id="272" r:id="rId9"/>
-    <p:sldId id="277" r:id="rId10"/>
-    <p:sldId id="276" r:id="rId11"/>
-    <p:sldId id="278" r:id="rId12"/>
-    <p:sldId id="261" r:id="rId13"/>
-    <p:sldId id="262" r:id="rId14"/>
-    <p:sldId id="263" r:id="rId15"/>
-    <p:sldId id="264" r:id="rId16"/>
-    <p:sldId id="279" r:id="rId17"/>
-    <p:sldId id="265" r:id="rId18"/>
+    <p:sldId id="270" r:id="rId6"/>
+    <p:sldId id="269" r:id="rId7"/>
+    <p:sldId id="272" r:id="rId8"/>
+    <p:sldId id="277" r:id="rId9"/>
+    <p:sldId id="276" r:id="rId10"/>
+    <p:sldId id="278" r:id="rId11"/>
+    <p:sldId id="261" r:id="rId12"/>
+    <p:sldId id="262" r:id="rId13"/>
+    <p:sldId id="263" r:id="rId14"/>
+    <p:sldId id="264" r:id="rId15"/>
+    <p:sldId id="279" r:id="rId16"/>
+    <p:sldId id="265" r:id="rId17"/>
   </p:sldIdLst>
   <p:sldSz cx="12192000" cy="6858000"/>
   <p:notesSz cx="6858000" cy="9144000"/>
@@ -213,7 +212,7 @@
           <a:p>
             <a:fld id="{DFA2E011-1CC6-4026-98C1-990352C279EE}" type="datetimeFigureOut">
               <a:rPr lang="en-US" smtClean="0"/>
-              <a:t>10/8/2018</a:t>
+              <a:t>10/9/2018</a:t>
             </a:fld>
             <a:endParaRPr lang="en-US"/>
           </a:p>
@@ -524,39 +523,8 @@
           <a:bodyPr/>
           <a:lstStyle/>
           <a:p>
-            <a:r>
-              <a:rPr lang="en-US" dirty="0"/>
-              <a:t>The random reward for a given arm each round is</a:t>
-            </a:r>
-            <a:r>
-              <a:rPr lang="en-US" i="1" dirty="0"/>
-              <a:t> </a:t>
-            </a:r>
-            <a:r>
-              <a:rPr lang="en-US" i="1" dirty="0" err="1"/>
-              <a:t>i.i.d</a:t>
-            </a:r>
-            <a:r>
-              <a:rPr lang="en-US" i="1" dirty="0"/>
-              <a:t> </a:t>
-            </a:r>
-            <a:r>
-              <a:rPr lang="en-US" dirty="0"/>
-              <a:t>and does not depend on the rewards of the other arms.</a:t>
-            </a:r>
-          </a:p>
-          <a:p>
             <a:endParaRPr lang="en-US" dirty="0"/>
           </a:p>
-          <a:p>
-            <a:r>
-              <a:rPr lang="en-US" dirty="0"/>
-              <a:t>The reward value is observed as soon as the arm is played</a:t>
-            </a:r>
-          </a:p>
-          <a:p>
-            <a:endParaRPr lang="en-US" dirty="0"/>
-          </a:p>
         </p:txBody>
       </p:sp>
       <p:sp>
@@ -566,7 +534,7 @@
             <a:spLocks noGrp="1"/>
           </p:cNvSpPr>
           <p:nvPr>
-            <p:ph type="sldNum" sz="quarter" idx="10"/>
+            <p:ph type="sldNum" sz="quarter" idx="5"/>
           </p:nvPr>
         </p:nvSpPr>
         <p:spPr/>
@@ -576,7 +544,7 @@
           <a:p>
             <a:fld id="{B42D21C2-7EE8-499C-AB19-BD0BEFDA3A32}" type="slidenum">
               <a:rPr lang="en-US" smtClean="0"/>
-              <a:t>3</a:t>
+              <a:t>1</a:t>
             </a:fld>
             <a:endParaRPr lang="en-US"/>
           </a:p>
@@ -585,7 +553,7 @@
     </p:spTree>
     <p:extLst>
       <p:ext uri="{BB962C8B-B14F-4D97-AF65-F5344CB8AC3E}">
-        <p14:creationId xmlns:p14="http://schemas.microsoft.com/office/powerpoint/2010/main" val="3985526320"/>
+        <p14:creationId xmlns:p14="http://schemas.microsoft.com/office/powerpoint/2010/main" val="92528487"/>
       </p:ext>
     </p:extLst>
   </p:cSld>
@@ -639,56 +607,38 @@
           <a:bodyPr/>
           <a:lstStyle/>
           <a:p>
-            <a:pPr marL="0" marR="0" lvl="0" indent="0" algn="l" defTabSz="914400" rtl="0" eaLnBrk="1" fontAlgn="auto" latinLnBrk="0" hangingPunct="1">
-              <a:lnSpc>
-                <a:spcPct val="100000"/>
-              </a:lnSpc>
-              <a:spcBef>
-                <a:spcPts val="0"/>
-              </a:spcBef>
-              <a:spcAft>
-                <a:spcPts val="0"/>
-              </a:spcAft>
-              <a:buClrTx/>
-              <a:buSzTx/>
-              <a:buFontTx/>
-              <a:buNone/>
-              <a:tabLst/>
-              <a:defRPr/>
-            </a:pPr>
             <a:r>
               <a:rPr lang="en-US" dirty="0"/>
-              <a:t>– Given a fixed amount of cash flow, what is the optimal policy to maximize the returns over a period of time.</a:t>
-            </a:r>
-          </a:p>
-          <a:p>
-            <a:pPr marL="0" marR="0" lvl="0" indent="0" algn="l" defTabSz="914400" rtl="0" eaLnBrk="1" fontAlgn="auto" latinLnBrk="0" hangingPunct="1">
-              <a:lnSpc>
-                <a:spcPct val="100000"/>
-              </a:lnSpc>
-              <a:spcBef>
-                <a:spcPts val="0"/>
-              </a:spcBef>
-              <a:spcAft>
-                <a:spcPts val="0"/>
-              </a:spcAft>
-              <a:buClrTx/>
-              <a:buSzTx/>
-              <a:buFontTx/>
-              <a:buNone/>
-              <a:tabLst/>
-              <a:defRPr/>
-            </a:pPr>
+              <a:t>The random reward for a given arm each round is</a:t>
+            </a:r>
+            <a:r>
+              <a:rPr lang="en-US" i="1" dirty="0"/>
+              <a:t> </a:t>
+            </a:r>
+            <a:r>
+              <a:rPr lang="en-US" i="1" dirty="0" err="1"/>
+              <a:t>i.i.d</a:t>
+            </a:r>
+            <a:r>
+              <a:rPr lang="en-US" i="1" dirty="0"/>
+              <a:t> </a:t>
+            </a:r>
             <a:r>
               <a:rPr lang="en-US" dirty="0"/>
-              <a:t>– Find the best possible treatment option from many other possible options while minimizing harmful effects for the patient.</a:t>
-            </a:r>
+              <a:t>and does not depend on the rewards of the other arms.</a:t>
+            </a:r>
+          </a:p>
+          <a:p>
+            <a:endParaRPr lang="en-US" dirty="0"/>
           </a:p>
           <a:p>
             <a:r>
               <a:rPr lang="en-US" dirty="0"/>
-              <a:t>– Choose the advertisement which gets the most clicks given your website traffic</a:t>
-            </a:r>
+              <a:t>The reward value is observed as soon as the arm is played</a:t>
+            </a:r>
+          </a:p>
+          <a:p>
+            <a:endParaRPr lang="en-US" dirty="0"/>
           </a:p>
         </p:txBody>
       </p:sp>
@@ -699,7 +649,7 @@
             <a:spLocks noGrp="1"/>
           </p:cNvSpPr>
           <p:nvPr>
-            <p:ph type="sldNum" sz="quarter" idx="5"/>
+            <p:ph type="sldNum" sz="quarter" idx="10"/>
           </p:nvPr>
         </p:nvSpPr>
         <p:spPr/>
@@ -709,7 +659,7 @@
           <a:p>
             <a:fld id="{B42D21C2-7EE8-499C-AB19-BD0BEFDA3A32}" type="slidenum">
               <a:rPr lang="en-US" smtClean="0"/>
-              <a:t>6</a:t>
+              <a:t>3</a:t>
             </a:fld>
             <a:endParaRPr lang="en-US"/>
           </a:p>
@@ -718,7 +668,7 @@
     </p:spTree>
     <p:extLst>
       <p:ext uri="{BB962C8B-B14F-4D97-AF65-F5344CB8AC3E}">
-        <p14:creationId xmlns:p14="http://schemas.microsoft.com/office/powerpoint/2010/main" val="2469815044"/>
+        <p14:creationId xmlns:p14="http://schemas.microsoft.com/office/powerpoint/2010/main" val="3985526320"/>
       </p:ext>
     </p:extLst>
   </p:cSld>
@@ -791,11 +741,8 @@
             </a:pPr>
             <a:r>
               <a:rPr lang="en-US" dirty="0"/>
-              <a:t>; gather more information to improve future decisions.</a:t>
-            </a:r>
-          </a:p>
-          <a:p>
-            <a:endParaRPr lang="en-US" dirty="0"/>
+              <a:t>– Given a fixed amount of cash flow, what is the optimal policy to maximize the returns over a period of time.</a:t>
+            </a:r>
           </a:p>
           <a:p>
             <a:pPr marL="0" marR="0" lvl="0" indent="0" algn="l" defTabSz="914400" rtl="0" eaLnBrk="1" fontAlgn="auto" latinLnBrk="0" hangingPunct="1">
@@ -817,11 +764,14 @@
             </a:pPr>
             <a:r>
               <a:rPr lang="en-US" dirty="0"/>
-              <a:t>; Make the best decision given the existing information.</a:t>
-            </a:r>
-          </a:p>
-          <a:p>
-            <a:endParaRPr lang="en-US" dirty="0"/>
+              <a:t>– Find the best possible treatment option from many other possible options while minimizing harmful effects for the patient.</a:t>
+            </a:r>
+          </a:p>
+          <a:p>
+            <a:r>
+              <a:rPr lang="en-US" dirty="0"/>
+              <a:t>– Choose the advertisement which gets the most clicks given your website traffic</a:t>
+            </a:r>
           </a:p>
         </p:txBody>
       </p:sp>
@@ -832,7 +782,7 @@
             <a:spLocks noGrp="1"/>
           </p:cNvSpPr>
           <p:nvPr>
-            <p:ph type="sldNum" sz="quarter" idx="10"/>
+            <p:ph type="sldNum" sz="quarter" idx="5"/>
           </p:nvPr>
         </p:nvSpPr>
         <p:spPr/>
@@ -842,7 +792,7 @@
           <a:p>
             <a:fld id="{B42D21C2-7EE8-499C-AB19-BD0BEFDA3A32}" type="slidenum">
               <a:rPr lang="en-US" smtClean="0"/>
-              <a:t>7</a:t>
+              <a:t>5</a:t>
             </a:fld>
             <a:endParaRPr lang="en-US"/>
           </a:p>
@@ -851,7 +801,7 @@
     </p:spTree>
     <p:extLst>
       <p:ext uri="{BB962C8B-B14F-4D97-AF65-F5344CB8AC3E}">
-        <p14:creationId xmlns:p14="http://schemas.microsoft.com/office/powerpoint/2010/main" val="3119427610"/>
+        <p14:creationId xmlns:p14="http://schemas.microsoft.com/office/powerpoint/2010/main" val="2469815044"/>
       </p:ext>
     </p:extLst>
   </p:cSld>
@@ -905,18 +855,52 @@
           <a:bodyPr/>
           <a:lstStyle/>
           <a:p>
+            <a:pPr marL="0" marR="0" lvl="0" indent="0" algn="l" defTabSz="914400" rtl="0" eaLnBrk="1" fontAlgn="auto" latinLnBrk="0" hangingPunct="1">
+              <a:lnSpc>
+                <a:spcPct val="100000"/>
+              </a:lnSpc>
+              <a:spcBef>
+                <a:spcPts val="0"/>
+              </a:spcBef>
+              <a:spcAft>
+                <a:spcPts val="0"/>
+              </a:spcAft>
+              <a:buClrTx/>
+              <a:buSzTx/>
+              <a:buFontTx/>
+              <a:buNone/>
+              <a:tabLst/>
+              <a:defRPr/>
+            </a:pPr>
             <a:r>
               <a:rPr lang="en-US" dirty="0"/>
-              <a:t>Explore : Visit the new restaurant to learn about it. You may like the new place and hopefully visit it more often or regret your decision </a:t>
+              <a:t>; gather more information to improve future decisions.</a:t>
             </a:r>
           </a:p>
           <a:p>
             <a:endParaRPr lang="en-US" dirty="0"/>
           </a:p>
           <a:p>
+            <a:pPr marL="0" marR="0" lvl="0" indent="0" algn="l" defTabSz="914400" rtl="0" eaLnBrk="1" fontAlgn="auto" latinLnBrk="0" hangingPunct="1">
+              <a:lnSpc>
+                <a:spcPct val="100000"/>
+              </a:lnSpc>
+              <a:spcBef>
+                <a:spcPts val="0"/>
+              </a:spcBef>
+              <a:spcAft>
+                <a:spcPts val="0"/>
+              </a:spcAft>
+              <a:buClrTx/>
+              <a:buSzTx/>
+              <a:buFontTx/>
+              <a:buNone/>
+              <a:tabLst/>
+              <a:defRPr/>
+            </a:pPr>
             <a:r>
               <a:rPr lang="en-US" dirty="0"/>
-              <a:t>Exploit : Go to the usual favorite restaurant and “exploit” the utility or value associated with the decision. You may lose out on finding a better restaurant</a:t>
+              <a:t>; Make the best decision given the existing information.</a:t>
             </a:r>
           </a:p>
           <a:p>
@@ -931,7 +915,7 @@
             <a:spLocks noGrp="1"/>
           </p:cNvSpPr>
           <p:nvPr>
-            <p:ph type="sldNum" sz="quarter" idx="5"/>
+            <p:ph type="sldNum" sz="quarter" idx="10"/>
           </p:nvPr>
         </p:nvSpPr>
         <p:spPr/>
@@ -941,7 +925,7 @@
           <a:p>
             <a:fld id="{B42D21C2-7EE8-499C-AB19-BD0BEFDA3A32}" type="slidenum">
               <a:rPr lang="en-US" smtClean="0"/>
-              <a:t>8</a:t>
+              <a:t>6</a:t>
             </a:fld>
             <a:endParaRPr lang="en-US"/>
           </a:p>
@@ -950,7 +934,7 @@
     </p:spTree>
     <p:extLst>
       <p:ext uri="{BB962C8B-B14F-4D97-AF65-F5344CB8AC3E}">
-        <p14:creationId xmlns:p14="http://schemas.microsoft.com/office/powerpoint/2010/main" val="4158521714"/>
+        <p14:creationId xmlns:p14="http://schemas.microsoft.com/office/powerpoint/2010/main" val="3119427610"/>
       </p:ext>
     </p:extLst>
   </p:cSld>
@@ -1004,6 +988,105 @@
           <a:bodyPr/>
           <a:lstStyle/>
           <a:p>
+            <a:r>
+              <a:rPr lang="en-US" dirty="0"/>
+              <a:t>Explore : Visit the new restaurant to learn about it. You may like the new place and hopefully visit it more often or regret your decision </a:t>
+            </a:r>
+          </a:p>
+          <a:p>
+            <a:endParaRPr lang="en-US" dirty="0"/>
+          </a:p>
+          <a:p>
+            <a:r>
+              <a:rPr lang="en-US" dirty="0"/>
+              <a:t>Exploit : Go to the usual favorite restaurant and “exploit” the utility or value associated with the decision. You may lose out on finding a better restaurant</a:t>
+            </a:r>
+          </a:p>
+          <a:p>
+            <a:endParaRPr lang="en-US" dirty="0"/>
+          </a:p>
+        </p:txBody>
+      </p:sp>
+      <p:sp>
+        <p:nvSpPr>
+          <p:cNvPr id="4" name="Slide Number Placeholder 3"/>
+          <p:cNvSpPr>
+            <a:spLocks noGrp="1"/>
+          </p:cNvSpPr>
+          <p:nvPr>
+            <p:ph type="sldNum" sz="quarter" idx="5"/>
+          </p:nvPr>
+        </p:nvSpPr>
+        <p:spPr/>
+        <p:txBody>
+          <a:bodyPr/>
+          <a:lstStyle/>
+          <a:p>
+            <a:fld id="{B42D21C2-7EE8-499C-AB19-BD0BEFDA3A32}" type="slidenum">
+              <a:rPr lang="en-US" smtClean="0"/>
+              <a:t>7</a:t>
+            </a:fld>
+            <a:endParaRPr lang="en-US"/>
+          </a:p>
+        </p:txBody>
+      </p:sp>
+    </p:spTree>
+    <p:extLst>
+      <p:ext uri="{BB962C8B-B14F-4D97-AF65-F5344CB8AC3E}">
+        <p14:creationId xmlns:p14="http://schemas.microsoft.com/office/powerpoint/2010/main" val="4158521714"/>
+      </p:ext>
+    </p:extLst>
+  </p:cSld>
+  <p:clrMapOvr>
+    <a:masterClrMapping/>
+  </p:clrMapOvr>
+</p:notes>
+</file>
+
+<file path=ppt/notesSlides/notesSlide6.xml><?xml version="1.0" encoding="utf-8"?>
+<p:notes xmlns:a="http://schemas.openxmlformats.org/drawingml/2006/main" xmlns:r="http://schemas.openxmlformats.org/officeDocument/2006/relationships" xmlns:p="http://schemas.openxmlformats.org/presentationml/2006/main">
+  <p:cSld>
+    <p:spTree>
+      <p:nvGrpSpPr>
+        <p:cNvPr id="1" name=""/>
+        <p:cNvGrpSpPr/>
+        <p:nvPr/>
+      </p:nvGrpSpPr>
+      <p:grpSpPr>
+        <a:xfrm>
+          <a:off x="0" y="0"/>
+          <a:ext cx="0" cy="0"/>
+          <a:chOff x="0" y="0"/>
+          <a:chExt cx="0" cy="0"/>
+        </a:xfrm>
+      </p:grpSpPr>
+      <p:sp>
+        <p:nvSpPr>
+          <p:cNvPr id="2" name="Slide Image Placeholder 1"/>
+          <p:cNvSpPr>
+            <a:spLocks noGrp="1" noRot="1" noChangeAspect="1"/>
+          </p:cNvSpPr>
+          <p:nvPr>
+            <p:ph type="sldImg"/>
+          </p:nvPr>
+        </p:nvSpPr>
+        <p:spPr/>
+      </p:sp>
+      <p:sp>
+        <p:nvSpPr>
+          <p:cNvPr id="3" name="Notes Placeholder 2"/>
+          <p:cNvSpPr>
+            <a:spLocks noGrp="1"/>
+          </p:cNvSpPr>
+          <p:nvPr>
+            <p:ph type="body" idx="1"/>
+          </p:nvPr>
+        </p:nvSpPr>
+        <p:spPr/>
+        <p:txBody>
+          <a:bodyPr/>
+          <a:lstStyle/>
+          <a:p>
             <a:pPr marL="0" marR="0" lvl="0" indent="0" algn="l" defTabSz="914400" rtl="0" eaLnBrk="1" fontAlgn="auto" latinLnBrk="0" hangingPunct="1">
               <a:lnSpc>
                 <a:spcPct val="100000"/>
@@ -1048,7 +1131,7 @@
           <a:p>
             <a:fld id="{B42D21C2-7EE8-499C-AB19-BD0BEFDA3A32}" type="slidenum">
               <a:rPr lang="en-US" smtClean="0"/>
-              <a:t>11</a:t>
+              <a:t>10</a:t>
             </a:fld>
             <a:endParaRPr lang="en-US"/>
           </a:p>
@@ -1236,7 +1319,7 @@
           <a:p>
             <a:fld id="{DBB57204-2EC6-4463-8E57-8B3F6CD6356C}" type="datetimeFigureOut">
               <a:rPr lang="en-US" smtClean="0"/>
-              <a:t>10/8/2018</a:t>
+              <a:t>10/9/2018</a:t>
             </a:fld>
             <a:endParaRPr lang="en-US"/>
           </a:p>
@@ -1566,7 +1649,7 @@
           <a:p>
             <a:fld id="{DBB57204-2EC6-4463-8E57-8B3F6CD6356C}" type="datetimeFigureOut">
               <a:rPr lang="en-US" smtClean="0"/>
-              <a:t>10/8/2018</a:t>
+              <a:t>10/9/2018</a:t>
             </a:fld>
             <a:endParaRPr lang="en-US"/>
           </a:p>
@@ -1746,7 +1829,7 @@
           <a:p>
             <a:fld id="{DBB57204-2EC6-4463-8E57-8B3F6CD6356C}" type="datetimeFigureOut">
               <a:rPr lang="en-US" smtClean="0"/>
-              <a:t>10/8/2018</a:t>
+              <a:t>10/9/2018</a:t>
             </a:fld>
             <a:endParaRPr lang="en-US"/>
           </a:p>
@@ -1916,7 +1999,7 @@
           <a:p>
             <a:fld id="{DBB57204-2EC6-4463-8E57-8B3F6CD6356C}" type="datetimeFigureOut">
               <a:rPr lang="en-US" smtClean="0"/>
-              <a:t>10/8/2018</a:t>
+              <a:t>10/9/2018</a:t>
             </a:fld>
             <a:endParaRPr lang="en-US"/>
           </a:p>
@@ -2193,7 +2276,7 @@
           <a:p>
             <a:fld id="{DBB57204-2EC6-4463-8E57-8B3F6CD6356C}" type="datetimeFigureOut">
               <a:rPr lang="en-US" smtClean="0"/>
-              <a:t>10/8/2018</a:t>
+              <a:t>10/9/2018</a:t>
             </a:fld>
             <a:endParaRPr lang="en-US"/>
           </a:p>
@@ -2587,7 +2670,7 @@
           <a:p>
             <a:fld id="{DBB57204-2EC6-4463-8E57-8B3F6CD6356C}" type="datetimeFigureOut">
               <a:rPr lang="en-US" smtClean="0"/>
-              <a:t>10/8/2018</a:t>
+              <a:t>10/9/2018</a:t>
             </a:fld>
             <a:endParaRPr lang="en-US"/>
           </a:p>
@@ -3064,7 +3147,7 @@
           <a:p>
             <a:fld id="{DBB57204-2EC6-4463-8E57-8B3F6CD6356C}" type="datetimeFigureOut">
               <a:rPr lang="en-US" smtClean="0"/>
-              <a:t>10/8/2018</a:t>
+              <a:t>10/9/2018</a:t>
             </a:fld>
             <a:endParaRPr lang="en-US"/>
           </a:p>
@@ -3182,7 +3265,7 @@
           <a:p>
             <a:fld id="{DBB57204-2EC6-4463-8E57-8B3F6CD6356C}" type="datetimeFigureOut">
               <a:rPr lang="en-US" smtClean="0"/>
-              <a:t>10/8/2018</a:t>
+              <a:t>10/9/2018</a:t>
             </a:fld>
             <a:endParaRPr lang="en-US"/>
           </a:p>
@@ -3277,7 +3360,7 @@
           <a:p>
             <a:fld id="{DBB57204-2EC6-4463-8E57-8B3F6CD6356C}" type="datetimeFigureOut">
               <a:rPr lang="en-US" smtClean="0"/>
-              <a:t>10/8/2018</a:t>
+              <a:t>10/9/2018</a:t>
             </a:fld>
             <a:endParaRPr lang="en-US"/>
           </a:p>
@@ -3623,7 +3706,7 @@
           <a:p>
             <a:fld id="{DBB57204-2EC6-4463-8E57-8B3F6CD6356C}" type="datetimeFigureOut">
               <a:rPr lang="en-US" smtClean="0"/>
-              <a:t>10/8/2018</a:t>
+              <a:t>10/9/2018</a:t>
             </a:fld>
             <a:endParaRPr lang="en-US"/>
           </a:p>
@@ -4011,7 +4094,7 @@
           <a:p>
             <a:fld id="{DBB57204-2EC6-4463-8E57-8B3F6CD6356C}" type="datetimeFigureOut">
               <a:rPr lang="en-US" smtClean="0"/>
-              <a:t>10/8/2018</a:t>
+              <a:t>10/9/2018</a:t>
             </a:fld>
             <a:endParaRPr lang="en-US"/>
           </a:p>
@@ -4289,7 +4372,7 @@
           <a:p>
             <a:fld id="{DBB57204-2EC6-4463-8E57-8B3F6CD6356C}" type="datetimeFigureOut">
               <a:rPr lang="en-US" smtClean="0"/>
-              <a:t>10/8/2018</a:t>
+              <a:t>10/9/2018</a:t>
             </a:fld>
             <a:endParaRPr lang="en-US"/>
           </a:p>
@@ -4886,7 +4969,7 @@
           <p:nvPr/>
         </p:nvPicPr>
         <p:blipFill>
-          <a:blip r:embed="rId2">
+          <a:blip r:embed="rId3">
             <a:extLst>
               <a:ext uri="{28A0092B-C50C-407E-A947-70E740481C1C}">
                 <a14:useLocalDpi xmlns:a14="http://schemas.microsoft.com/office/drawing/2010/main" val="0"/>
@@ -4942,674 +5025,6 @@
           <p:cNvPr id="2" name="Title 1">
             <a:extLst>
               <a:ext uri="{FF2B5EF4-FFF2-40B4-BE49-F238E27FC236}">
-                <a16:creationId xmlns:a16="http://schemas.microsoft.com/office/drawing/2014/main" id="{4A6BEBCB-0F79-496D-9B27-46D59C18F6A6}"/>
-              </a:ext>
-            </a:extLst>
-          </p:cNvPr>
-          <p:cNvSpPr>
-            <a:spLocks noGrp="1"/>
-          </p:cNvSpPr>
-          <p:nvPr>
-            <p:ph type="title"/>
-          </p:nvPr>
-        </p:nvSpPr>
-        <p:spPr/>
-        <p:txBody>
-          <a:bodyPr/>
-          <a:lstStyle/>
-          <a:p>
-            <a:r>
-              <a:rPr lang="en-US" dirty="0"/>
-              <a:t>Demo MAB Case</a:t>
-            </a:r>
-          </a:p>
-        </p:txBody>
-      </p:sp>
-      <p:pic>
-        <p:nvPicPr>
-          <p:cNvPr id="5" name="Picture 3" descr="dmsinterface_slot">
-            <a:hlinkClick r:id="rId2"/>
-            <a:extLst>
-              <a:ext uri="{FF2B5EF4-FFF2-40B4-BE49-F238E27FC236}">
-                <a16:creationId xmlns:a16="http://schemas.microsoft.com/office/drawing/2014/main" id="{7E4028DA-4327-483A-8DAF-BA98E84213D2}"/>
-              </a:ext>
-            </a:extLst>
-          </p:cNvPr>
-          <p:cNvPicPr>
-            <a:picLocks noChangeAspect="1" noChangeArrowheads="1"/>
-          </p:cNvPicPr>
-          <p:nvPr/>
-        </p:nvPicPr>
-        <p:blipFill>
-          <a:blip r:embed="rId3">
-            <a:extLst>
-              <a:ext uri="{28A0092B-C50C-407E-A947-70E740481C1C}">
-                <a14:useLocalDpi xmlns:a14="http://schemas.microsoft.com/office/drawing/2010/main" val="0"/>
-              </a:ext>
-            </a:extLst>
-          </a:blip>
-          <a:srcRect/>
-          <a:stretch>
-            <a:fillRect/>
-          </a:stretch>
-        </p:blipFill>
-        <p:spPr bwMode="auto">
-          <a:xfrm>
-            <a:off x="4480972" y="1557337"/>
-            <a:ext cx="1209675" cy="1343025"/>
-          </a:xfrm>
-          <a:prstGeom prst="rect">
-            <a:avLst/>
-          </a:prstGeom>
-          <a:noFill/>
-          <a:extLst>
-            <a:ext uri="{909E8E84-426E-40DD-AFC4-6F175D3DCCD1}">
-              <a14:hiddenFill xmlns:a14="http://schemas.microsoft.com/office/drawing/2010/main">
-                <a:solidFill>
-                  <a:srgbClr val="FFFFFF"/>
-                </a:solidFill>
-              </a14:hiddenFill>
-            </a:ext>
-          </a:extLst>
-        </p:spPr>
-      </p:pic>
-      <p:pic>
-        <p:nvPicPr>
-          <p:cNvPr id="6" name="Picture 3" descr="dmsinterface_slot">
-            <a:hlinkClick r:id="rId2"/>
-            <a:extLst>
-              <a:ext uri="{FF2B5EF4-FFF2-40B4-BE49-F238E27FC236}">
-                <a16:creationId xmlns:a16="http://schemas.microsoft.com/office/drawing/2014/main" id="{CC83C576-A43D-4054-B624-7DBDED6089B3}"/>
-              </a:ext>
-            </a:extLst>
-          </p:cNvPr>
-          <p:cNvPicPr>
-            <a:picLocks noChangeAspect="1" noChangeArrowheads="1"/>
-          </p:cNvPicPr>
-          <p:nvPr/>
-        </p:nvPicPr>
-        <p:blipFill>
-          <a:blip r:embed="rId3">
-            <a:extLst>
-              <a:ext uri="{28A0092B-C50C-407E-A947-70E740481C1C}">
-                <a14:useLocalDpi xmlns:a14="http://schemas.microsoft.com/office/drawing/2010/main" val="0"/>
-              </a:ext>
-            </a:extLst>
-          </a:blip>
-          <a:srcRect/>
-          <a:stretch>
-            <a:fillRect/>
-          </a:stretch>
-        </p:blipFill>
-        <p:spPr bwMode="auto">
-          <a:xfrm>
-            <a:off x="6636518" y="1557337"/>
-            <a:ext cx="1209675" cy="1343025"/>
-          </a:xfrm>
-          <a:prstGeom prst="rect">
-            <a:avLst/>
-          </a:prstGeom>
-          <a:noFill/>
-          <a:extLst>
-            <a:ext uri="{909E8E84-426E-40DD-AFC4-6F175D3DCCD1}">
-              <a14:hiddenFill xmlns:a14="http://schemas.microsoft.com/office/drawing/2010/main">
-                <a:solidFill>
-                  <a:srgbClr val="FFFFFF"/>
-                </a:solidFill>
-              </a14:hiddenFill>
-            </a:ext>
-          </a:extLst>
-        </p:spPr>
-      </p:pic>
-      <p:pic>
-        <p:nvPicPr>
-          <p:cNvPr id="7" name="Picture 3" descr="dmsinterface_slot">
-            <a:hlinkClick r:id="rId2"/>
-            <a:extLst>
-              <a:ext uri="{FF2B5EF4-FFF2-40B4-BE49-F238E27FC236}">
-                <a16:creationId xmlns:a16="http://schemas.microsoft.com/office/drawing/2014/main" id="{F1336A49-FA3B-401B-994A-C1486B625CDF}"/>
-              </a:ext>
-            </a:extLst>
-          </p:cNvPr>
-          <p:cNvPicPr>
-            <a:picLocks noChangeAspect="1" noChangeArrowheads="1"/>
-          </p:cNvPicPr>
-          <p:nvPr/>
-        </p:nvPicPr>
-        <p:blipFill>
-          <a:blip r:embed="rId3">
-            <a:extLst>
-              <a:ext uri="{28A0092B-C50C-407E-A947-70E740481C1C}">
-                <a14:useLocalDpi xmlns:a14="http://schemas.microsoft.com/office/drawing/2010/main" val="0"/>
-              </a:ext>
-            </a:extLst>
-          </a:blip>
-          <a:srcRect/>
-          <a:stretch>
-            <a:fillRect/>
-          </a:stretch>
-        </p:blipFill>
-        <p:spPr bwMode="auto">
-          <a:xfrm>
-            <a:off x="2317471" y="1557338"/>
-            <a:ext cx="1209675" cy="1343025"/>
-          </a:xfrm>
-          <a:prstGeom prst="rect">
-            <a:avLst/>
-          </a:prstGeom>
-          <a:noFill/>
-          <a:extLst>
-            <a:ext uri="{909E8E84-426E-40DD-AFC4-6F175D3DCCD1}">
-              <a14:hiddenFill xmlns:a14="http://schemas.microsoft.com/office/drawing/2010/main">
-                <a:solidFill>
-                  <a:srgbClr val="FFFFFF"/>
-                </a:solidFill>
-              </a14:hiddenFill>
-            </a:ext>
-          </a:extLst>
-        </p:spPr>
-      </p:pic>
-      <p:sp>
-        <p:nvSpPr>
-          <p:cNvPr id="9" name="Content Placeholder 8">
-            <a:extLst>
-              <a:ext uri="{FF2B5EF4-FFF2-40B4-BE49-F238E27FC236}">
-                <a16:creationId xmlns:a16="http://schemas.microsoft.com/office/drawing/2014/main" id="{7ED6C89E-D369-4390-95A9-C9A1D02398F0}"/>
-              </a:ext>
-            </a:extLst>
-          </p:cNvPr>
-          <p:cNvSpPr>
-            <a:spLocks noGrp="1"/>
-          </p:cNvSpPr>
-          <p:nvPr>
-            <p:ph idx="1"/>
-          </p:nvPr>
-        </p:nvSpPr>
-        <p:spPr/>
-        <p:txBody>
-          <a:bodyPr/>
-          <a:lstStyle/>
-          <a:p>
-            <a:pPr marL="0" indent="0">
-              <a:buNone/>
-            </a:pPr>
-            <a:endParaRPr lang="en-US" dirty="0"/>
-          </a:p>
-          <a:p>
-            <a:pPr marL="0" indent="0">
-              <a:buNone/>
-            </a:pPr>
-            <a:endParaRPr lang="en-US" dirty="0"/>
-          </a:p>
-          <a:p>
-            <a:pPr marL="0" indent="0">
-              <a:buNone/>
-            </a:pPr>
-            <a:endParaRPr lang="en-US" dirty="0"/>
-          </a:p>
-          <a:p>
-            <a:pPr marL="0" indent="0">
-              <a:buNone/>
-            </a:pPr>
-            <a:endParaRPr lang="en-US" dirty="0"/>
-          </a:p>
-        </p:txBody>
-      </p:sp>
-      <p:sp>
-        <p:nvSpPr>
-          <p:cNvPr id="10" name="TextBox 9">
-            <a:extLst>
-              <a:ext uri="{FF2B5EF4-FFF2-40B4-BE49-F238E27FC236}">
-                <a16:creationId xmlns:a16="http://schemas.microsoft.com/office/drawing/2014/main" id="{31F6B00C-66CB-424E-9C2A-5D2BF9953882}"/>
-              </a:ext>
-            </a:extLst>
-          </p:cNvPr>
-          <p:cNvSpPr txBox="1"/>
-          <p:nvPr/>
-        </p:nvSpPr>
-        <p:spPr>
-          <a:xfrm>
-            <a:off x="2587656" y="2936005"/>
-            <a:ext cx="669303" cy="461665"/>
-          </a:xfrm>
-          <a:prstGeom prst="rect">
-            <a:avLst/>
-          </a:prstGeom>
-          <a:noFill/>
-        </p:spPr>
-        <p:txBody>
-          <a:bodyPr wrap="square" rtlCol="0">
-            <a:spAutoFit/>
-          </a:bodyPr>
-          <a:lstStyle/>
-          <a:p>
-            <a:r>
-              <a:rPr lang="en-US" sz="2400" dirty="0"/>
-              <a:t>P</a:t>
-            </a:r>
-            <a:r>
-              <a:rPr lang="en-US" sz="1600" dirty="0"/>
-              <a:t>1</a:t>
-            </a:r>
-            <a:endParaRPr lang="en-US" dirty="0"/>
-          </a:p>
-        </p:txBody>
-      </p:sp>
-      <p:sp>
-        <p:nvSpPr>
-          <p:cNvPr id="13" name="TextBox 12">
-            <a:extLst>
-              <a:ext uri="{FF2B5EF4-FFF2-40B4-BE49-F238E27FC236}">
-                <a16:creationId xmlns:a16="http://schemas.microsoft.com/office/drawing/2014/main" id="{99FCC10A-E5E6-4638-91CF-1E2374939B58}"/>
-              </a:ext>
-            </a:extLst>
-          </p:cNvPr>
-          <p:cNvSpPr txBox="1"/>
-          <p:nvPr/>
-        </p:nvSpPr>
-        <p:spPr>
-          <a:xfrm>
-            <a:off x="6906703" y="2936006"/>
-            <a:ext cx="669303" cy="461665"/>
-          </a:xfrm>
-          <a:prstGeom prst="rect">
-            <a:avLst/>
-          </a:prstGeom>
-          <a:noFill/>
-        </p:spPr>
-        <p:txBody>
-          <a:bodyPr wrap="square" rtlCol="0">
-            <a:spAutoFit/>
-          </a:bodyPr>
-          <a:lstStyle/>
-          <a:p>
-            <a:r>
-              <a:rPr lang="en-US" sz="2400" dirty="0"/>
-              <a:t>P</a:t>
-            </a:r>
-            <a:r>
-              <a:rPr lang="en-US" sz="1600" dirty="0"/>
-              <a:t>3</a:t>
-            </a:r>
-            <a:endParaRPr lang="en-US" dirty="0"/>
-          </a:p>
-        </p:txBody>
-      </p:sp>
-      <p:sp>
-        <p:nvSpPr>
-          <p:cNvPr id="14" name="TextBox 13">
-            <a:extLst>
-              <a:ext uri="{FF2B5EF4-FFF2-40B4-BE49-F238E27FC236}">
-                <a16:creationId xmlns:a16="http://schemas.microsoft.com/office/drawing/2014/main" id="{2358C70F-31C8-4370-ACBA-6D050A551BF6}"/>
-              </a:ext>
-            </a:extLst>
-          </p:cNvPr>
-          <p:cNvSpPr txBox="1"/>
-          <p:nvPr/>
-        </p:nvSpPr>
-        <p:spPr>
-          <a:xfrm>
-            <a:off x="4805336" y="2956480"/>
-            <a:ext cx="669303" cy="461665"/>
-          </a:xfrm>
-          <a:prstGeom prst="rect">
-            <a:avLst/>
-          </a:prstGeom>
-          <a:noFill/>
-        </p:spPr>
-        <p:txBody>
-          <a:bodyPr wrap="square" rtlCol="0">
-            <a:spAutoFit/>
-          </a:bodyPr>
-          <a:lstStyle/>
-          <a:p>
-            <a:r>
-              <a:rPr lang="en-US" sz="2400" dirty="0"/>
-              <a:t>P</a:t>
-            </a:r>
-            <a:r>
-              <a:rPr lang="en-US" sz="1600" dirty="0"/>
-              <a:t>2</a:t>
-            </a:r>
-            <a:endParaRPr lang="en-US" dirty="0"/>
-          </a:p>
-        </p:txBody>
-      </p:sp>
-      <mc:AlternateContent xmlns:mc="http://schemas.openxmlformats.org/markup-compatibility/2006" xmlns:a14="http://schemas.microsoft.com/office/drawing/2010/main">
-        <mc:Choice Requires="a14">
-          <p:sp>
-            <p:nvSpPr>
-              <p:cNvPr id="15" name="TextBox 14">
-                <a:extLst>
-                  <a:ext uri="{FF2B5EF4-FFF2-40B4-BE49-F238E27FC236}">
-                    <a16:creationId xmlns:a16="http://schemas.microsoft.com/office/drawing/2014/main" id="{E3FD57A2-3407-4DFB-9CBB-47B49CAF3DDC}"/>
-                  </a:ext>
-                </a:extLst>
-              </p:cNvPr>
-              <p:cNvSpPr txBox="1"/>
-              <p:nvPr/>
-            </p:nvSpPr>
-            <p:spPr>
-              <a:xfrm>
-                <a:off x="1727865" y="3511970"/>
-                <a:ext cx="8491172" cy="2246769"/>
-              </a:xfrm>
-              <a:prstGeom prst="rect">
-                <a:avLst/>
-              </a:prstGeom>
-              <a:noFill/>
-            </p:spPr>
-            <p:txBody>
-              <a:bodyPr wrap="square" rtlCol="0">
-                <a:spAutoFit/>
-              </a:bodyPr>
-              <a:lstStyle/>
-              <a:p>
-                <a:pPr marL="285750" indent="-285750">
-                  <a:buFont typeface="Wingdings" panose="05000000000000000000" pitchFamily="2" charset="2"/>
-                  <a:buChar char="§"/>
-                </a:pPr>
-                <a:r>
-                  <a:rPr lang="en-US" sz="2000" dirty="0"/>
-                  <a:t>The reward takes two discrete values : 0 and 1</a:t>
-                </a:r>
-              </a:p>
-              <a:p>
-                <a:pPr marL="285750" indent="-285750">
-                  <a:buFont typeface="Wingdings" panose="05000000000000000000" pitchFamily="2" charset="2"/>
-                  <a:buChar char="§"/>
-                </a:pPr>
-                <a:endParaRPr lang="en-US" sz="2000" dirty="0"/>
-              </a:p>
-              <a:p>
-                <a:pPr marL="285750" indent="-285750">
-                  <a:buFont typeface="Wingdings" panose="05000000000000000000" pitchFamily="2" charset="2"/>
-                  <a:buChar char="§"/>
-                </a:pPr>
-                <a:r>
-                  <a:rPr lang="en-US" sz="2000" dirty="0"/>
-                  <a:t>Assume that the reward follows a Bernoulli distribution</a:t>
-                </a:r>
-              </a:p>
-              <a:p>
-                <a:pPr marL="285750" indent="-285750">
-                  <a:buFont typeface="Wingdings" panose="05000000000000000000" pitchFamily="2" charset="2"/>
-                  <a:buChar char="§"/>
-                </a:pPr>
-                <a:endParaRPr lang="en-US" sz="2000" dirty="0"/>
-              </a:p>
-              <a:p>
-                <a:pPr/>
-                <a14:m>
-                  <m:oMathPara xmlns:m="http://schemas.openxmlformats.org/officeDocument/2006/math">
-                    <m:oMathParaPr>
-                      <m:jc m:val="centerGroup"/>
-                    </m:oMathParaPr>
-                    <m:oMath xmlns:m="http://schemas.openxmlformats.org/officeDocument/2006/math">
-                      <m:func>
-                        <m:funcPr>
-                          <m:ctrlPr>
-                            <a:rPr lang="en-US" sz="2000" b="0" i="1" smtClean="0">
-                              <a:latin typeface="Cambria Math" panose="02040503050406030204" pitchFamily="18" charset="0"/>
-                            </a:rPr>
-                          </m:ctrlPr>
-                        </m:funcPr>
-                        <m:fName>
-                          <m:r>
-                            <m:rPr>
-                              <m:sty m:val="p"/>
-                            </m:rPr>
-                            <a:rPr lang="en-US" sz="2000" b="0" i="0" smtClean="0">
-                              <a:latin typeface="Cambria Math" panose="02040503050406030204" pitchFamily="18" charset="0"/>
-                            </a:rPr>
-                            <m:t>Pr</m:t>
-                          </m:r>
-                        </m:fName>
-                        <m:e>
-                          <m:d>
-                            <m:dPr>
-                              <m:ctrlPr>
-                                <a:rPr lang="en-US" sz="2000" b="0" i="1" smtClean="0">
-                                  <a:latin typeface="Cambria Math" panose="02040503050406030204" pitchFamily="18" charset="0"/>
-                                </a:rPr>
-                              </m:ctrlPr>
-                            </m:dPr>
-                            <m:e>
-                              <m:r>
-                                <a:rPr lang="en-US" sz="2000" b="0" i="1" smtClean="0">
-                                  <a:latin typeface="Cambria Math" panose="02040503050406030204" pitchFamily="18" charset="0"/>
-                                </a:rPr>
-                                <m:t>𝑟</m:t>
-                              </m:r>
-                              <m:r>
-                                <a:rPr lang="en-US" sz="2000" b="0" i="1" smtClean="0">
-                                  <a:latin typeface="Cambria Math" panose="02040503050406030204" pitchFamily="18" charset="0"/>
-                                </a:rPr>
-                                <m:t>|</m:t>
-                              </m:r>
-                              <m:r>
-                                <a:rPr lang="en-US" sz="2000" b="0" i="1" smtClean="0">
-                                  <a:latin typeface="Cambria Math" panose="02040503050406030204" pitchFamily="18" charset="0"/>
-                                </a:rPr>
-                                <m:t>𝜃</m:t>
-                              </m:r>
-                            </m:e>
-                          </m:d>
-                        </m:e>
-                      </m:func>
-                      <m:r>
-                        <a:rPr lang="en-US" sz="2000" b="0" i="1" smtClean="0">
-                          <a:latin typeface="Cambria Math" panose="02040503050406030204" pitchFamily="18" charset="0"/>
-                        </a:rPr>
-                        <m:t>=</m:t>
-                      </m:r>
-                      <m:sSup>
-                        <m:sSupPr>
-                          <m:ctrlPr>
-                            <a:rPr lang="en-US" sz="2000" b="0" i="1" smtClean="0">
-                              <a:latin typeface="Cambria Math" panose="02040503050406030204" pitchFamily="18" charset="0"/>
-                            </a:rPr>
-                          </m:ctrlPr>
-                        </m:sSupPr>
-                        <m:e>
-                          <m:r>
-                            <a:rPr lang="en-US" sz="2000" b="0" i="1" smtClean="0">
-                              <a:latin typeface="Cambria Math" panose="02040503050406030204" pitchFamily="18" charset="0"/>
-                            </a:rPr>
-                            <m:t>𝜃</m:t>
-                          </m:r>
-                        </m:e>
-                        <m:sup>
-                          <m:r>
-                            <a:rPr lang="en-US" sz="2000" b="0" i="1" smtClean="0">
-                              <a:latin typeface="Cambria Math" panose="02040503050406030204" pitchFamily="18" charset="0"/>
-                            </a:rPr>
-                            <m:t>𝑟</m:t>
-                          </m:r>
-                        </m:sup>
-                      </m:sSup>
-                      <m:sSup>
-                        <m:sSupPr>
-                          <m:ctrlPr>
-                            <a:rPr lang="en-US" sz="2000" b="0" i="1" smtClean="0">
-                              <a:latin typeface="Cambria Math" panose="02040503050406030204" pitchFamily="18" charset="0"/>
-                            </a:rPr>
-                          </m:ctrlPr>
-                        </m:sSupPr>
-                        <m:e>
-                          <m:d>
-                            <m:dPr>
-                              <m:ctrlPr>
-                                <a:rPr lang="en-US" sz="2000" b="0" i="1" smtClean="0">
-                                  <a:latin typeface="Cambria Math" panose="02040503050406030204" pitchFamily="18" charset="0"/>
-                                </a:rPr>
-                              </m:ctrlPr>
-                            </m:dPr>
-                            <m:e>
-                              <m:r>
-                                <a:rPr lang="en-US" sz="2000" b="0" i="1" smtClean="0">
-                                  <a:latin typeface="Cambria Math" panose="02040503050406030204" pitchFamily="18" charset="0"/>
-                                </a:rPr>
-                                <m:t>1−</m:t>
-                              </m:r>
-                              <m:r>
-                                <a:rPr lang="en-US" sz="2000" b="0" i="1" smtClean="0">
-                                  <a:latin typeface="Cambria Math" panose="02040503050406030204" pitchFamily="18" charset="0"/>
-                                </a:rPr>
-                                <m:t>𝜃</m:t>
-                              </m:r>
-                            </m:e>
-                          </m:d>
-                        </m:e>
-                        <m:sup>
-                          <m:r>
-                            <a:rPr lang="en-US" sz="2000" b="0" i="1" smtClean="0">
-                              <a:latin typeface="Cambria Math" panose="02040503050406030204" pitchFamily="18" charset="0"/>
-                            </a:rPr>
-                            <m:t>1−</m:t>
-                          </m:r>
-                          <m:r>
-                            <a:rPr lang="en-US" sz="2000" b="0" i="1" smtClean="0">
-                              <a:latin typeface="Cambria Math" panose="02040503050406030204" pitchFamily="18" charset="0"/>
-                            </a:rPr>
-                            <m:t>𝑟</m:t>
-                          </m:r>
-                        </m:sup>
-                      </m:sSup>
-                      <m:r>
-                        <a:rPr lang="en-US" sz="2000" b="0" i="1" smtClean="0">
-                          <a:latin typeface="Cambria Math" panose="02040503050406030204" pitchFamily="18" charset="0"/>
-                        </a:rPr>
-                        <m:t>,  </m:t>
-                      </m:r>
-                      <m:r>
-                        <a:rPr lang="en-US" sz="2000" b="0" i="1" smtClean="0">
-                          <a:latin typeface="Cambria Math" panose="02040503050406030204" pitchFamily="18" charset="0"/>
-                        </a:rPr>
-                        <m:t>𝑟</m:t>
-                      </m:r>
-                      <m:r>
-                        <a:rPr lang="en-US" sz="2000" b="0" i="1" smtClean="0">
-                          <a:latin typeface="Cambria Math" panose="02040503050406030204" pitchFamily="18" charset="0"/>
-                        </a:rPr>
-                        <m:t>∈</m:t>
-                      </m:r>
-                      <m:d>
-                        <m:dPr>
-                          <m:begChr m:val="{"/>
-                          <m:endChr m:val="}"/>
-                          <m:ctrlPr>
-                            <a:rPr lang="en-US" sz="2000" b="0" i="1" smtClean="0">
-                              <a:latin typeface="Cambria Math" panose="02040503050406030204" pitchFamily="18" charset="0"/>
-                            </a:rPr>
-                          </m:ctrlPr>
-                        </m:dPr>
-                        <m:e>
-                          <m:r>
-                            <a:rPr lang="en-US" sz="2000" b="0" i="1" smtClean="0">
-                              <a:latin typeface="Cambria Math" panose="02040503050406030204" pitchFamily="18" charset="0"/>
-                            </a:rPr>
-                            <m:t>0,1</m:t>
-                          </m:r>
-                        </m:e>
-                      </m:d>
-                    </m:oMath>
-                  </m:oMathPara>
-                </a14:m>
-                <a:endParaRPr lang="en-US" sz="2000" dirty="0"/>
-              </a:p>
-              <a:p>
-                <a:endParaRPr lang="en-US" sz="2000" dirty="0"/>
-              </a:p>
-              <a:p>
-                <a:r>
-                  <a:rPr lang="en-US" sz="2000" dirty="0"/>
-                  <a:t>  </a:t>
-                </a:r>
-              </a:p>
-            </p:txBody>
-          </p:sp>
-        </mc:Choice>
-        <mc:Fallback xmlns="">
-          <p:sp>
-            <p:nvSpPr>
-              <p:cNvPr id="15" name="TextBox 14">
-                <a:extLst>
-                  <a:ext uri="{FF2B5EF4-FFF2-40B4-BE49-F238E27FC236}">
-                    <a16:creationId xmlns:a16="http://schemas.microsoft.com/office/drawing/2014/main" id="{E3FD57A2-3407-4DFB-9CBB-47B49CAF3DDC}"/>
-                  </a:ext>
-                </a:extLst>
-              </p:cNvPr>
-              <p:cNvSpPr txBox="1">
-                <a:spLocks noRot="1" noChangeAspect="1" noMove="1" noResize="1" noEditPoints="1" noAdjustHandles="1" noChangeArrowheads="1" noChangeShapeType="1" noTextEdit="1"/>
-              </p:cNvSpPr>
-              <p:nvPr/>
-            </p:nvSpPr>
-            <p:spPr>
-              <a:xfrm>
-                <a:off x="1727865" y="3511970"/>
-                <a:ext cx="8491172" cy="2246769"/>
-              </a:xfrm>
-              <a:prstGeom prst="rect">
-                <a:avLst/>
-              </a:prstGeom>
-              <a:blipFill>
-                <a:blip r:embed="rId4"/>
-                <a:stretch>
-                  <a:fillRect l="-646" t="-1355"/>
-                </a:stretch>
-              </a:blipFill>
-            </p:spPr>
-            <p:txBody>
-              <a:bodyPr/>
-              <a:lstStyle/>
-              <a:p>
-                <a:r>
-                  <a:rPr lang="en-US">
-                    <a:noFill/>
-                  </a:rPr>
-                  <a:t> </a:t>
-                </a:r>
-              </a:p>
-            </p:txBody>
-          </p:sp>
-        </mc:Fallback>
-      </mc:AlternateContent>
-    </p:spTree>
-    <p:extLst>
-      <p:ext uri="{BB962C8B-B14F-4D97-AF65-F5344CB8AC3E}">
-        <p14:creationId xmlns:p14="http://schemas.microsoft.com/office/powerpoint/2010/main" val="1287553037"/>
-      </p:ext>
-    </p:extLst>
-  </p:cSld>
-  <p:clrMapOvr>
-    <a:masterClrMapping/>
-  </p:clrMapOvr>
-</p:sld>
-</file>
-
-<file path=ppt/slides/slide11.xml><?xml version="1.0" encoding="utf-8"?>
-<p:sld xmlns:a="http://schemas.openxmlformats.org/drawingml/2006/main" xmlns:r="http://schemas.openxmlformats.org/officeDocument/2006/relationships" xmlns:p="http://schemas.openxmlformats.org/presentationml/2006/main">
-  <p:cSld>
-    <p:spTree>
-      <p:nvGrpSpPr>
-        <p:cNvPr id="1" name=""/>
-        <p:cNvGrpSpPr/>
-        <p:nvPr/>
-      </p:nvGrpSpPr>
-      <p:grpSpPr>
-        <a:xfrm>
-          <a:off x="0" y="0"/>
-          <a:ext cx="0" cy="0"/>
-          <a:chOff x="0" y="0"/>
-          <a:chExt cx="0" cy="0"/>
-        </a:xfrm>
-      </p:grpSpPr>
-      <p:sp>
-        <p:nvSpPr>
-          <p:cNvPr id="2" name="Title 1">
-            <a:extLst>
-              <a:ext uri="{FF2B5EF4-FFF2-40B4-BE49-F238E27FC236}">
                 <a16:creationId xmlns:a16="http://schemas.microsoft.com/office/drawing/2014/main" id="{EB21097E-7DE0-4E98-A66A-7204F4700202}"/>
               </a:ext>
             </a:extLst>
@@ -5633,8 +5048,8 @@
           </a:p>
         </p:txBody>
       </p:sp>
-      <mc:AlternateContent xmlns:mc="http://schemas.openxmlformats.org/markup-compatibility/2006">
-        <mc:Choice xmlns:a14="http://schemas.microsoft.com/office/drawing/2010/main" Requires="a14">
+      <mc:AlternateContent xmlns:mc="http://schemas.openxmlformats.org/markup-compatibility/2006" xmlns:a14="http://schemas.microsoft.com/office/drawing/2010/main">
+        <mc:Choice Requires="a14">
           <p:sp>
             <p:nvSpPr>
               <p:cNvPr id="3" name="Content Placeholder 2">
@@ -6051,7 +5466,7 @@
             </p:txBody>
           </p:sp>
         </mc:Choice>
-        <mc:Fallback>
+        <mc:Fallback xmlns="">
           <p:sp>
             <p:nvSpPr>
               <p:cNvPr id="3" name="Content Placeholder 2">
@@ -6144,7 +5559,7 @@
 </p:sld>
 </file>
 
-<file path=ppt/slides/slide12.xml><?xml version="1.0" encoding="utf-8"?>
+<file path=ppt/slides/slide11.xml><?xml version="1.0" encoding="utf-8"?>
 <p:sld xmlns:a="http://schemas.openxmlformats.org/drawingml/2006/main" xmlns:r="http://schemas.openxmlformats.org/officeDocument/2006/relationships" xmlns:p="http://schemas.openxmlformats.org/presentationml/2006/main">
   <p:cSld>
     <p:spTree>
@@ -7089,7 +6504,7 @@
 </p:sld>
 </file>
 
-<file path=ppt/slides/slide13.xml><?xml version="1.0" encoding="utf-8"?>
+<file path=ppt/slides/slide12.xml><?xml version="1.0" encoding="utf-8"?>
 <p:sld xmlns:a="http://schemas.openxmlformats.org/drawingml/2006/main" xmlns:r="http://schemas.openxmlformats.org/officeDocument/2006/relationships" xmlns:p="http://schemas.openxmlformats.org/presentationml/2006/main">
   <p:cSld>
     <p:spTree>
@@ -7224,7 +6639,7 @@
 </p:sld>
 </file>
 
-<file path=ppt/slides/slide14.xml><?xml version="1.0" encoding="utf-8"?>
+<file path=ppt/slides/slide13.xml><?xml version="1.0" encoding="utf-8"?>
 <p:sld xmlns:a="http://schemas.openxmlformats.org/drawingml/2006/main" xmlns:r="http://schemas.openxmlformats.org/officeDocument/2006/relationships" xmlns:p="http://schemas.openxmlformats.org/presentationml/2006/main">
   <p:cSld>
     <p:spTree>
@@ -7530,7 +6945,7 @@
 </p:sld>
 </file>
 
-<file path=ppt/slides/slide15.xml><?xml version="1.0" encoding="utf-8"?>
+<file path=ppt/slides/slide14.xml><?xml version="1.0" encoding="utf-8"?>
 <p:sld xmlns:a="http://schemas.openxmlformats.org/drawingml/2006/main" xmlns:r="http://schemas.openxmlformats.org/officeDocument/2006/relationships" xmlns:p="http://schemas.openxmlformats.org/presentationml/2006/main">
   <p:cSld>
     <p:spTree>
@@ -7828,7 +7243,7 @@
 </p:sld>
 </file>
 
-<file path=ppt/slides/slide16.xml><?xml version="1.0" encoding="utf-8"?>
+<file path=ppt/slides/slide15.xml><?xml version="1.0" encoding="utf-8"?>
 <p:sld xmlns:a="http://schemas.openxmlformats.org/drawingml/2006/main" xmlns:r="http://schemas.openxmlformats.org/officeDocument/2006/relationships" xmlns:p="http://schemas.openxmlformats.org/presentationml/2006/main">
   <p:cSld>
     <p:spTree>
@@ -7958,7 +7373,7 @@
 </p:sld>
 </file>
 
-<file path=ppt/slides/slide17.xml><?xml version="1.0" encoding="utf-8"?>
+<file path=ppt/slides/slide16.xml><?xml version="1.0" encoding="utf-8"?>
 <p:sld xmlns:a="http://schemas.openxmlformats.org/drawingml/2006/main" xmlns:r="http://schemas.openxmlformats.org/officeDocument/2006/relationships" xmlns:p="http://schemas.openxmlformats.org/presentationml/2006/main">
   <p:cSld>
     <p:spTree>
@@ -8401,8 +7816,8 @@
           </a:fontRef>
         </p:style>
       </p:sp>
-      <mc:AlternateContent xmlns:mc="http://schemas.openxmlformats.org/markup-compatibility/2006">
-        <mc:Choice xmlns:a14="http://schemas.microsoft.com/office/drawing/2010/main" Requires="a14">
+      <mc:AlternateContent xmlns:mc="http://schemas.openxmlformats.org/markup-compatibility/2006" xmlns:a14="http://schemas.microsoft.com/office/drawing/2010/main">
+        <mc:Choice Requires="a14">
           <p:sp>
             <p:nvSpPr>
               <p:cNvPr id="3" name="Content Placeholder 2">
@@ -8612,7 +8027,7 @@
             </p:txBody>
           </p:sp>
         </mc:Choice>
-        <mc:Fallback>
+        <mc:Fallback xmlns="">
           <p:sp>
             <p:nvSpPr>
               <p:cNvPr id="3" name="Content Placeholder 2">
@@ -9374,7 +8789,7 @@
           <p:cNvPr id="2" name="Title 1">
             <a:extLst>
               <a:ext uri="{FF2B5EF4-FFF2-40B4-BE49-F238E27FC236}">
-                <a16:creationId xmlns:a16="http://schemas.microsoft.com/office/drawing/2014/main" id="{35AF5709-28E0-41E9-AA19-BEBFC0D15AB4}"/>
+                <a16:creationId xmlns:a16="http://schemas.microsoft.com/office/drawing/2014/main" id="{CF8A8BB0-D910-451F-BEC3-F87BCDFB50C4}"/>
               </a:ext>
             </a:extLst>
           </p:cNvPr>
@@ -9392,7 +8807,7 @@
           <a:p>
             <a:r>
               <a:rPr lang="en-US" dirty="0"/>
-              <a:t>General MAB Summary</a:t>
+              <a:t>MAB Examples</a:t>
             </a:r>
           </a:p>
         </p:txBody>
@@ -9402,7 +8817,7 @@
           <p:cNvPr id="3" name="Content Placeholder 2">
             <a:extLst>
               <a:ext uri="{FF2B5EF4-FFF2-40B4-BE49-F238E27FC236}">
-                <a16:creationId xmlns:a16="http://schemas.microsoft.com/office/drawing/2014/main" id="{87DDF89C-ED34-44A5-90B2-02D6518B6D81}"/>
+                <a16:creationId xmlns:a16="http://schemas.microsoft.com/office/drawing/2014/main" id="{D1AB754C-6ED9-4E72-B77B-ED60142D5301}"/>
               </a:ext>
             </a:extLst>
           </p:cNvPr>
@@ -9413,26 +8828,30 @@
             <p:ph idx="1"/>
           </p:nvPr>
         </p:nvSpPr>
-        <p:spPr/>
-        <p:txBody>
-          <a:bodyPr/>
+        <p:spPr>
+          <a:xfrm>
+            <a:off x="1182254" y="2014825"/>
+            <a:ext cx="9979891" cy="3458094"/>
+          </a:xfrm>
+        </p:spPr>
+        <p:txBody>
+          <a:bodyPr>
+            <a:normAutofit/>
+          </a:bodyPr>
           <a:lstStyle/>
           <a:p>
             <a:r>
               <a:rPr lang="en-US" dirty="0"/>
-              <a:t>To summarize, the MAB problem is a finite resource allocation problem where the objective is to maximize total returns. </a:t>
-            </a:r>
-          </a:p>
-          <a:p>
-            <a:pPr marL="0" indent="0">
-              <a:buNone/>
-            </a:pPr>
+              <a:t>Financial investment</a:t>
+            </a:r>
+          </a:p>
+          <a:p>
             <a:endParaRPr lang="en-US" dirty="0"/>
           </a:p>
           <a:p>
             <a:r>
               <a:rPr lang="en-US" dirty="0"/>
-              <a:t>The return of each choice is unknown or only partially known beforehand</a:t>
+              <a:t>Clinical trials</a:t>
             </a:r>
           </a:p>
           <a:p>
@@ -9441,14 +8860,8 @@
           <a:p>
             <a:r>
               <a:rPr lang="en-US" dirty="0"/>
-              <a:t>The agent accumulates knowledge about the bandit as it takes actions</a:t>
-            </a:r>
-          </a:p>
-          <a:p>
-            <a:endParaRPr lang="en-US" dirty="0"/>
-          </a:p>
-          <a:p>
-            <a:endParaRPr lang="en-US" dirty="0"/>
+              <a:t>Digital advertisements</a:t>
+            </a:r>
           </a:p>
           <a:p>
             <a:endParaRPr lang="en-US" dirty="0"/>
@@ -9461,7 +8874,7 @@
     </p:spTree>
     <p:extLst>
       <p:ext uri="{BB962C8B-B14F-4D97-AF65-F5344CB8AC3E}">
-        <p14:creationId xmlns:p14="http://schemas.microsoft.com/office/powerpoint/2010/main" val="2485927780"/>
+        <p14:creationId xmlns:p14="http://schemas.microsoft.com/office/powerpoint/2010/main" val="1872673048"/>
       </p:ext>
     </p:extLst>
   </p:cSld>
@@ -9493,123 +8906,6 @@
           <p:cNvPr id="2" name="Title 1">
             <a:extLst>
               <a:ext uri="{FF2B5EF4-FFF2-40B4-BE49-F238E27FC236}">
-                <a16:creationId xmlns:a16="http://schemas.microsoft.com/office/drawing/2014/main" id="{CF8A8BB0-D910-451F-BEC3-F87BCDFB50C4}"/>
-              </a:ext>
-            </a:extLst>
-          </p:cNvPr>
-          <p:cNvSpPr>
-            <a:spLocks noGrp="1"/>
-          </p:cNvSpPr>
-          <p:nvPr>
-            <p:ph type="title"/>
-          </p:nvPr>
-        </p:nvSpPr>
-        <p:spPr/>
-        <p:txBody>
-          <a:bodyPr/>
-          <a:lstStyle/>
-          <a:p>
-            <a:r>
-              <a:rPr lang="en-US" dirty="0"/>
-              <a:t>MAB Examples</a:t>
-            </a:r>
-          </a:p>
-        </p:txBody>
-      </p:sp>
-      <p:sp>
-        <p:nvSpPr>
-          <p:cNvPr id="3" name="Content Placeholder 2">
-            <a:extLst>
-              <a:ext uri="{FF2B5EF4-FFF2-40B4-BE49-F238E27FC236}">
-                <a16:creationId xmlns:a16="http://schemas.microsoft.com/office/drawing/2014/main" id="{D1AB754C-6ED9-4E72-B77B-ED60142D5301}"/>
-              </a:ext>
-            </a:extLst>
-          </p:cNvPr>
-          <p:cNvSpPr>
-            <a:spLocks noGrp="1"/>
-          </p:cNvSpPr>
-          <p:nvPr>
-            <p:ph idx="1"/>
-          </p:nvPr>
-        </p:nvSpPr>
-        <p:spPr>
-          <a:xfrm>
-            <a:off x="1182254" y="2014825"/>
-            <a:ext cx="9979891" cy="3458094"/>
-          </a:xfrm>
-        </p:spPr>
-        <p:txBody>
-          <a:bodyPr>
-            <a:normAutofit/>
-          </a:bodyPr>
-          <a:lstStyle/>
-          <a:p>
-            <a:r>
-              <a:rPr lang="en-US" dirty="0"/>
-              <a:t>Financial investment</a:t>
-            </a:r>
-          </a:p>
-          <a:p>
-            <a:endParaRPr lang="en-US" dirty="0"/>
-          </a:p>
-          <a:p>
-            <a:r>
-              <a:rPr lang="en-US" dirty="0"/>
-              <a:t>Clinical trials</a:t>
-            </a:r>
-          </a:p>
-          <a:p>
-            <a:endParaRPr lang="en-US" dirty="0"/>
-          </a:p>
-          <a:p>
-            <a:r>
-              <a:rPr lang="en-US" dirty="0"/>
-              <a:t>Digital advertisements</a:t>
-            </a:r>
-          </a:p>
-          <a:p>
-            <a:endParaRPr lang="en-US" dirty="0"/>
-          </a:p>
-          <a:p>
-            <a:endParaRPr lang="en-US" dirty="0"/>
-          </a:p>
-        </p:txBody>
-      </p:sp>
-    </p:spTree>
-    <p:extLst>
-      <p:ext uri="{BB962C8B-B14F-4D97-AF65-F5344CB8AC3E}">
-        <p14:creationId xmlns:p14="http://schemas.microsoft.com/office/powerpoint/2010/main" val="1872673048"/>
-      </p:ext>
-    </p:extLst>
-  </p:cSld>
-  <p:clrMapOvr>
-    <a:masterClrMapping/>
-  </p:clrMapOvr>
-</p:sld>
-</file>
-
-<file path=ppt/slides/slide7.xml><?xml version="1.0" encoding="utf-8"?>
-<p:sld xmlns:a="http://schemas.openxmlformats.org/drawingml/2006/main" xmlns:r="http://schemas.openxmlformats.org/officeDocument/2006/relationships" xmlns:p="http://schemas.openxmlformats.org/presentationml/2006/main">
-  <p:cSld>
-    <p:spTree>
-      <p:nvGrpSpPr>
-        <p:cNvPr id="1" name=""/>
-        <p:cNvGrpSpPr/>
-        <p:nvPr/>
-      </p:nvGrpSpPr>
-      <p:grpSpPr>
-        <a:xfrm>
-          <a:off x="0" y="0"/>
-          <a:ext cx="0" cy="0"/>
-          <a:chOff x="0" y="0"/>
-          <a:chExt cx="0" cy="0"/>
-        </a:xfrm>
-      </p:grpSpPr>
-      <p:sp>
-        <p:nvSpPr>
-          <p:cNvPr id="2" name="Title 1">
-            <a:extLst>
-              <a:ext uri="{FF2B5EF4-FFF2-40B4-BE49-F238E27FC236}">
                 <a16:creationId xmlns:a16="http://schemas.microsoft.com/office/drawing/2014/main" id="{44F1E078-34F0-4314-AF47-CF93E11A4E07}"/>
               </a:ext>
             </a:extLst>
@@ -9747,7 +9043,7 @@
 </p:sld>
 </file>
 
-<file path=ppt/slides/slide8.xml><?xml version="1.0" encoding="utf-8"?>
+<file path=ppt/slides/slide7.xml><?xml version="1.0" encoding="utf-8"?>
 <p:sld xmlns:a="http://schemas.openxmlformats.org/drawingml/2006/main" xmlns:r="http://schemas.openxmlformats.org/officeDocument/2006/relationships" xmlns:p="http://schemas.openxmlformats.org/presentationml/2006/main">
   <p:cSld>
     <p:spTree>
@@ -9849,6 +9145,162 @@
 </p:sld>
 </file>
 
+<file path=ppt/slides/slide8.xml><?xml version="1.0" encoding="utf-8"?>
+<p:sld xmlns:a="http://schemas.openxmlformats.org/drawingml/2006/main" xmlns:r="http://schemas.openxmlformats.org/officeDocument/2006/relationships" xmlns:p="http://schemas.openxmlformats.org/presentationml/2006/main">
+  <p:cSld>
+    <p:spTree>
+      <p:nvGrpSpPr>
+        <p:cNvPr id="1" name=""/>
+        <p:cNvGrpSpPr/>
+        <p:nvPr/>
+      </p:nvGrpSpPr>
+      <p:grpSpPr>
+        <a:xfrm>
+          <a:off x="0" y="0"/>
+          <a:ext cx="0" cy="0"/>
+          <a:chOff x="0" y="0"/>
+          <a:chExt cx="0" cy="0"/>
+        </a:xfrm>
+      </p:grpSpPr>
+      <p:sp>
+        <p:nvSpPr>
+          <p:cNvPr id="2" name="Title 1">
+            <a:extLst>
+              <a:ext uri="{FF2B5EF4-FFF2-40B4-BE49-F238E27FC236}">
+                <a16:creationId xmlns:a16="http://schemas.microsoft.com/office/drawing/2014/main" id="{D2BDE79B-8E85-492D-876B-6E06B0283CB9}"/>
+              </a:ext>
+            </a:extLst>
+          </p:cNvPr>
+          <p:cNvSpPr>
+            <a:spLocks noGrp="1"/>
+          </p:cNvSpPr>
+          <p:nvPr>
+            <p:ph type="title"/>
+          </p:nvPr>
+        </p:nvSpPr>
+        <p:spPr/>
+        <p:txBody>
+          <a:bodyPr/>
+          <a:lstStyle/>
+          <a:p>
+            <a:r>
+              <a:rPr lang="en-US" dirty="0"/>
+              <a:t>MAB problem strategies</a:t>
+            </a:r>
+          </a:p>
+        </p:txBody>
+      </p:sp>
+      <p:sp>
+        <p:nvSpPr>
+          <p:cNvPr id="3" name="Content Placeholder 2">
+            <a:extLst>
+              <a:ext uri="{FF2B5EF4-FFF2-40B4-BE49-F238E27FC236}">
+                <a16:creationId xmlns:a16="http://schemas.microsoft.com/office/drawing/2014/main" id="{4AE623EB-D452-4AA5-B675-DB85E6D301F9}"/>
+              </a:ext>
+            </a:extLst>
+          </p:cNvPr>
+          <p:cNvSpPr>
+            <a:spLocks noGrp="1"/>
+          </p:cNvSpPr>
+          <p:nvPr>
+            <p:ph idx="1"/>
+          </p:nvPr>
+        </p:nvSpPr>
+        <p:spPr>
+          <a:xfrm>
+            <a:off x="1295400" y="1992590"/>
+            <a:ext cx="9601200" cy="3581400"/>
+          </a:xfrm>
+        </p:spPr>
+        <p:txBody>
+          <a:bodyPr/>
+          <a:lstStyle/>
+          <a:p>
+            <a:r>
+              <a:rPr lang="en-US" dirty="0"/>
+              <a:t>No exploration : A naïve approach, often yields sub-optimal results</a:t>
+            </a:r>
+          </a:p>
+          <a:p>
+            <a:r>
+              <a:rPr lang="en-US" dirty="0"/>
+              <a:t>Exploration at random</a:t>
+            </a:r>
+          </a:p>
+          <a:p>
+            <a:r>
+              <a:rPr lang="en-US" dirty="0"/>
+              <a:t>Algorithmic exploration </a:t>
+            </a:r>
+          </a:p>
+          <a:p>
+            <a:pPr lvl="1"/>
+            <a:r>
+              <a:rPr lang="el-GR" dirty="0"/>
+              <a:t>ϵ</a:t>
+            </a:r>
+            <a:r>
+              <a:rPr lang="en-US" dirty="0"/>
+              <a:t> -Greedy Selection </a:t>
+            </a:r>
+          </a:p>
+          <a:p>
+            <a:pPr lvl="1"/>
+            <a:r>
+              <a:rPr lang="en-US" dirty="0"/>
+              <a:t>UCB arm selection </a:t>
+            </a:r>
+          </a:p>
+          <a:p>
+            <a:pPr lvl="1"/>
+            <a:r>
+              <a:rPr lang="en-US" dirty="0"/>
+              <a:t>Thompson sampling</a:t>
+            </a:r>
+          </a:p>
+          <a:p>
+            <a:pPr lvl="1"/>
+            <a:r>
+              <a:rPr lang="en-US" dirty="0"/>
+              <a:t>Etc. </a:t>
+            </a:r>
+          </a:p>
+          <a:p>
+            <a:endParaRPr lang="en-US" dirty="0"/>
+          </a:p>
+          <a:p>
+            <a:endParaRPr lang="en-US" dirty="0"/>
+          </a:p>
+          <a:p>
+            <a:endParaRPr lang="en-US" dirty="0"/>
+          </a:p>
+          <a:p>
+            <a:pPr marL="0" indent="0">
+              <a:buNone/>
+            </a:pPr>
+            <a:endParaRPr lang="en-US" dirty="0"/>
+          </a:p>
+          <a:p>
+            <a:endParaRPr lang="en-US" dirty="0"/>
+          </a:p>
+          <a:p>
+            <a:endParaRPr lang="en-US" dirty="0"/>
+          </a:p>
+        </p:txBody>
+      </p:sp>
+    </p:spTree>
+    <p:extLst>
+      <p:ext uri="{BB962C8B-B14F-4D97-AF65-F5344CB8AC3E}">
+        <p14:creationId xmlns:p14="http://schemas.microsoft.com/office/powerpoint/2010/main" val="3016005494"/>
+      </p:ext>
+    </p:extLst>
+  </p:cSld>
+  <p:clrMapOvr>
+    <a:masterClrMapping/>
+  </p:clrMapOvr>
+</p:sld>
+</file>
+
 <file path=ppt/slides/slide9.xml><?xml version="1.0" encoding="utf-8"?>
 <p:sld xmlns:a="http://schemas.openxmlformats.org/drawingml/2006/main" xmlns:r="http://schemas.openxmlformats.org/officeDocument/2006/relationships" xmlns:p="http://schemas.openxmlformats.org/presentationml/2006/main">
   <p:cSld>
@@ -9871,7 +9323,7 @@
           <p:cNvPr id="2" name="Title 1">
             <a:extLst>
               <a:ext uri="{FF2B5EF4-FFF2-40B4-BE49-F238E27FC236}">
-                <a16:creationId xmlns:a16="http://schemas.microsoft.com/office/drawing/2014/main" id="{D2BDE79B-8E85-492D-876B-6E06B0283CB9}"/>
+                <a16:creationId xmlns:a16="http://schemas.microsoft.com/office/drawing/2014/main" id="{4A6BEBCB-0F79-496D-9B27-46D59C18F6A6}"/>
               </a:ext>
             </a:extLst>
           </p:cNvPr>
@@ -9889,20 +9341,164 @@
           <a:p>
             <a:r>
               <a:rPr lang="en-US" dirty="0"/>
-              <a:t>MAB problem strategies</a:t>
-            </a:r>
-          </a:p>
-        </p:txBody>
-      </p:sp>
-      <p:sp>
-        <p:nvSpPr>
-          <p:cNvPr id="3" name="Content Placeholder 2">
+              <a:t>Demo MAB Case</a:t>
+            </a:r>
+          </a:p>
+        </p:txBody>
+      </p:sp>
+      <p:pic>
+        <p:nvPicPr>
+          <p:cNvPr id="5" name="Picture 3" descr="dmsinterface_slot">
+            <a:hlinkClick r:id="rId2"/>
             <a:extLst>
               <a:ext uri="{FF2B5EF4-FFF2-40B4-BE49-F238E27FC236}">
-                <a16:creationId xmlns:a16="http://schemas.microsoft.com/office/drawing/2014/main" id="{4AE623EB-D452-4AA5-B675-DB85E6D301F9}"/>
+                <a16:creationId xmlns:a16="http://schemas.microsoft.com/office/drawing/2014/main" id="{7E4028DA-4327-483A-8DAF-BA98E84213D2}"/>
               </a:ext>
             </a:extLst>
           </p:cNvPr>
+          <p:cNvPicPr>
+            <a:picLocks noChangeAspect="1" noChangeArrowheads="1"/>
+          </p:cNvPicPr>
+          <p:nvPr/>
+        </p:nvPicPr>
+        <p:blipFill>
+          <a:blip r:embed="rId3">
+            <a:extLst>
+              <a:ext uri="{28A0092B-C50C-407E-A947-70E740481C1C}">
+                <a14:useLocalDpi xmlns:a14="http://schemas.microsoft.com/office/drawing/2010/main" val="0"/>
+              </a:ext>
+            </a:extLst>
+          </a:blip>
+          <a:srcRect/>
+          <a:stretch>
+            <a:fillRect/>
+          </a:stretch>
+        </p:blipFill>
+        <p:spPr bwMode="auto">
+          <a:xfrm>
+            <a:off x="4480972" y="1557337"/>
+            <a:ext cx="1209675" cy="1343025"/>
+          </a:xfrm>
+          <a:prstGeom prst="rect">
+            <a:avLst/>
+          </a:prstGeom>
+          <a:noFill/>
+          <a:extLst>
+            <a:ext uri="{909E8E84-426E-40DD-AFC4-6F175D3DCCD1}">
+              <a14:hiddenFill xmlns:a14="http://schemas.microsoft.com/office/drawing/2010/main">
+                <a:solidFill>
+                  <a:srgbClr val="FFFFFF"/>
+                </a:solidFill>
+              </a14:hiddenFill>
+            </a:ext>
+          </a:extLst>
+        </p:spPr>
+      </p:pic>
+      <p:pic>
+        <p:nvPicPr>
+          <p:cNvPr id="6" name="Picture 3" descr="dmsinterface_slot">
+            <a:hlinkClick r:id="rId2"/>
+            <a:extLst>
+              <a:ext uri="{FF2B5EF4-FFF2-40B4-BE49-F238E27FC236}">
+                <a16:creationId xmlns:a16="http://schemas.microsoft.com/office/drawing/2014/main" id="{CC83C576-A43D-4054-B624-7DBDED6089B3}"/>
+              </a:ext>
+            </a:extLst>
+          </p:cNvPr>
+          <p:cNvPicPr>
+            <a:picLocks noChangeAspect="1" noChangeArrowheads="1"/>
+          </p:cNvPicPr>
+          <p:nvPr/>
+        </p:nvPicPr>
+        <p:blipFill>
+          <a:blip r:embed="rId3">
+            <a:extLst>
+              <a:ext uri="{28A0092B-C50C-407E-A947-70E740481C1C}">
+                <a14:useLocalDpi xmlns:a14="http://schemas.microsoft.com/office/drawing/2010/main" val="0"/>
+              </a:ext>
+            </a:extLst>
+          </a:blip>
+          <a:srcRect/>
+          <a:stretch>
+            <a:fillRect/>
+          </a:stretch>
+        </p:blipFill>
+        <p:spPr bwMode="auto">
+          <a:xfrm>
+            <a:off x="6636518" y="1557337"/>
+            <a:ext cx="1209675" cy="1343025"/>
+          </a:xfrm>
+          <a:prstGeom prst="rect">
+            <a:avLst/>
+          </a:prstGeom>
+          <a:noFill/>
+          <a:extLst>
+            <a:ext uri="{909E8E84-426E-40DD-AFC4-6F175D3DCCD1}">
+              <a14:hiddenFill xmlns:a14="http://schemas.microsoft.com/office/drawing/2010/main">
+                <a:solidFill>
+                  <a:srgbClr val="FFFFFF"/>
+                </a:solidFill>
+              </a14:hiddenFill>
+            </a:ext>
+          </a:extLst>
+        </p:spPr>
+      </p:pic>
+      <p:pic>
+        <p:nvPicPr>
+          <p:cNvPr id="7" name="Picture 3" descr="dmsinterface_slot">
+            <a:hlinkClick r:id="rId2"/>
+            <a:extLst>
+              <a:ext uri="{FF2B5EF4-FFF2-40B4-BE49-F238E27FC236}">
+                <a16:creationId xmlns:a16="http://schemas.microsoft.com/office/drawing/2014/main" id="{F1336A49-FA3B-401B-994A-C1486B625CDF}"/>
+              </a:ext>
+            </a:extLst>
+          </p:cNvPr>
+          <p:cNvPicPr>
+            <a:picLocks noChangeAspect="1" noChangeArrowheads="1"/>
+          </p:cNvPicPr>
+          <p:nvPr/>
+        </p:nvPicPr>
+        <p:blipFill>
+          <a:blip r:embed="rId3">
+            <a:extLst>
+              <a:ext uri="{28A0092B-C50C-407E-A947-70E740481C1C}">
+                <a14:useLocalDpi xmlns:a14="http://schemas.microsoft.com/office/drawing/2010/main" val="0"/>
+              </a:ext>
+            </a:extLst>
+          </a:blip>
+          <a:srcRect/>
+          <a:stretch>
+            <a:fillRect/>
+          </a:stretch>
+        </p:blipFill>
+        <p:spPr bwMode="auto">
+          <a:xfrm>
+            <a:off x="2317471" y="1557338"/>
+            <a:ext cx="1209675" cy="1343025"/>
+          </a:xfrm>
+          <a:prstGeom prst="rect">
+            <a:avLst/>
+          </a:prstGeom>
+          <a:noFill/>
+          <a:extLst>
+            <a:ext uri="{909E8E84-426E-40DD-AFC4-6F175D3DCCD1}">
+              <a14:hiddenFill xmlns:a14="http://schemas.microsoft.com/office/drawing/2010/main">
+                <a:solidFill>
+                  <a:srgbClr val="FFFFFF"/>
+                </a:solidFill>
+              </a14:hiddenFill>
+            </a:ext>
+          </a:extLst>
+        </p:spPr>
+      </p:pic>
+      <p:sp>
+        <p:nvSpPr>
+          <p:cNvPr id="9" name="Content Placeholder 8">
+            <a:extLst>
+              <a:ext uri="{FF2B5EF4-FFF2-40B4-BE49-F238E27FC236}">
+                <a16:creationId xmlns:a16="http://schemas.microsoft.com/office/drawing/2014/main" id="{7ED6C89E-D369-4390-95A9-C9A1D02398F0}"/>
+              </a:ext>
+            </a:extLst>
+          </p:cNvPr>
           <p:cNvSpPr>
             <a:spLocks noGrp="1"/>
           </p:cNvSpPr>
@@ -9910,74 +9506,10 @@
             <p:ph idx="1"/>
           </p:nvPr>
         </p:nvSpPr>
-        <p:spPr>
-          <a:xfrm>
-            <a:off x="1295400" y="1992590"/>
-            <a:ext cx="9601200" cy="3581400"/>
-          </a:xfrm>
-        </p:spPr>
+        <p:spPr/>
         <p:txBody>
           <a:bodyPr/>
           <a:lstStyle/>
-          <a:p>
-            <a:r>
-              <a:rPr lang="en-US" dirty="0"/>
-              <a:t>No exploration : A naïve approach, often yields sub-optimal results</a:t>
-            </a:r>
-          </a:p>
-          <a:p>
-            <a:r>
-              <a:rPr lang="en-US" dirty="0"/>
-              <a:t>Exploration at random</a:t>
-            </a:r>
-          </a:p>
-          <a:p>
-            <a:r>
-              <a:rPr lang="en-US" dirty="0"/>
-              <a:t>Algorithmic exploration </a:t>
-            </a:r>
-          </a:p>
-          <a:p>
-            <a:pPr lvl="1"/>
-            <a:r>
-              <a:rPr lang="el-GR" dirty="0"/>
-              <a:t>ϵ</a:t>
-            </a:r>
-            <a:r>
-              <a:rPr lang="en-US" dirty="0"/>
-              <a:t> -Greedy Selection </a:t>
-            </a:r>
-          </a:p>
-          <a:p>
-            <a:pPr lvl="1"/>
-            <a:r>
-              <a:rPr lang="en-US" dirty="0"/>
-              <a:t>UCB arm selection </a:t>
-            </a:r>
-          </a:p>
-          <a:p>
-            <a:pPr lvl="1"/>
-            <a:r>
-              <a:rPr lang="en-US" dirty="0"/>
-              <a:t>Thompson sampling</a:t>
-            </a:r>
-          </a:p>
-          <a:p>
-            <a:pPr lvl="1"/>
-            <a:r>
-              <a:rPr lang="en-US" dirty="0"/>
-              <a:t>Etc. </a:t>
-            </a:r>
-          </a:p>
-          <a:p>
-            <a:endParaRPr lang="en-US" dirty="0"/>
-          </a:p>
-          <a:p>
-            <a:endParaRPr lang="en-US" dirty="0"/>
-          </a:p>
-          <a:p>
-            <a:endParaRPr lang="en-US" dirty="0"/>
-          </a:p>
           <a:p>
             <a:pPr marL="0" indent="0">
               <a:buNone/>
@@ -9985,17 +9517,449 @@
             <a:endParaRPr lang="en-US" dirty="0"/>
           </a:p>
           <a:p>
+            <a:pPr marL="0" indent="0">
+              <a:buNone/>
+            </a:pPr>
             <a:endParaRPr lang="en-US" dirty="0"/>
           </a:p>
           <a:p>
+            <a:pPr marL="0" indent="0">
+              <a:buNone/>
+            </a:pPr>
             <a:endParaRPr lang="en-US" dirty="0"/>
           </a:p>
-        </p:txBody>
-      </p:sp>
+          <a:p>
+            <a:pPr marL="0" indent="0">
+              <a:buNone/>
+            </a:pPr>
+            <a:endParaRPr lang="en-US" dirty="0"/>
+          </a:p>
+        </p:txBody>
+      </p:sp>
+      <p:sp>
+        <p:nvSpPr>
+          <p:cNvPr id="10" name="TextBox 9">
+            <a:extLst>
+              <a:ext uri="{FF2B5EF4-FFF2-40B4-BE49-F238E27FC236}">
+                <a16:creationId xmlns:a16="http://schemas.microsoft.com/office/drawing/2014/main" id="{31F6B00C-66CB-424E-9C2A-5D2BF9953882}"/>
+              </a:ext>
+            </a:extLst>
+          </p:cNvPr>
+          <p:cNvSpPr txBox="1"/>
+          <p:nvPr/>
+        </p:nvSpPr>
+        <p:spPr>
+          <a:xfrm>
+            <a:off x="2587656" y="2936005"/>
+            <a:ext cx="669303" cy="461665"/>
+          </a:xfrm>
+          <a:prstGeom prst="rect">
+            <a:avLst/>
+          </a:prstGeom>
+          <a:noFill/>
+        </p:spPr>
+        <p:txBody>
+          <a:bodyPr wrap="square" rtlCol="0">
+            <a:spAutoFit/>
+          </a:bodyPr>
+          <a:lstStyle/>
+          <a:p>
+            <a:r>
+              <a:rPr lang="en-US" sz="2400" dirty="0"/>
+              <a:t>P</a:t>
+            </a:r>
+            <a:r>
+              <a:rPr lang="en-US" sz="1600" dirty="0"/>
+              <a:t>1</a:t>
+            </a:r>
+            <a:endParaRPr lang="en-US" dirty="0"/>
+          </a:p>
+        </p:txBody>
+      </p:sp>
+      <p:sp>
+        <p:nvSpPr>
+          <p:cNvPr id="13" name="TextBox 12">
+            <a:extLst>
+              <a:ext uri="{FF2B5EF4-FFF2-40B4-BE49-F238E27FC236}">
+                <a16:creationId xmlns:a16="http://schemas.microsoft.com/office/drawing/2014/main" id="{99FCC10A-E5E6-4638-91CF-1E2374939B58}"/>
+              </a:ext>
+            </a:extLst>
+          </p:cNvPr>
+          <p:cNvSpPr txBox="1"/>
+          <p:nvPr/>
+        </p:nvSpPr>
+        <p:spPr>
+          <a:xfrm>
+            <a:off x="6906703" y="2936006"/>
+            <a:ext cx="669303" cy="461665"/>
+          </a:xfrm>
+          <a:prstGeom prst="rect">
+            <a:avLst/>
+          </a:prstGeom>
+          <a:noFill/>
+        </p:spPr>
+        <p:txBody>
+          <a:bodyPr wrap="square" rtlCol="0">
+            <a:spAutoFit/>
+          </a:bodyPr>
+          <a:lstStyle/>
+          <a:p>
+            <a:r>
+              <a:rPr lang="en-US" sz="2400" dirty="0"/>
+              <a:t>P</a:t>
+            </a:r>
+            <a:r>
+              <a:rPr lang="en-US" sz="1600" dirty="0"/>
+              <a:t>3</a:t>
+            </a:r>
+            <a:endParaRPr lang="en-US" dirty="0"/>
+          </a:p>
+        </p:txBody>
+      </p:sp>
+      <p:sp>
+        <p:nvSpPr>
+          <p:cNvPr id="14" name="TextBox 13">
+            <a:extLst>
+              <a:ext uri="{FF2B5EF4-FFF2-40B4-BE49-F238E27FC236}">
+                <a16:creationId xmlns:a16="http://schemas.microsoft.com/office/drawing/2014/main" id="{2358C70F-31C8-4370-ACBA-6D050A551BF6}"/>
+              </a:ext>
+            </a:extLst>
+          </p:cNvPr>
+          <p:cNvSpPr txBox="1"/>
+          <p:nvPr/>
+        </p:nvSpPr>
+        <p:spPr>
+          <a:xfrm>
+            <a:off x="4805336" y="2956480"/>
+            <a:ext cx="669303" cy="461665"/>
+          </a:xfrm>
+          <a:prstGeom prst="rect">
+            <a:avLst/>
+          </a:prstGeom>
+          <a:noFill/>
+        </p:spPr>
+        <p:txBody>
+          <a:bodyPr wrap="square" rtlCol="0">
+            <a:spAutoFit/>
+          </a:bodyPr>
+          <a:lstStyle/>
+          <a:p>
+            <a:r>
+              <a:rPr lang="en-US" sz="2400" dirty="0"/>
+              <a:t>P</a:t>
+            </a:r>
+            <a:r>
+              <a:rPr lang="en-US" sz="1600" dirty="0"/>
+              <a:t>2</a:t>
+            </a:r>
+            <a:endParaRPr lang="en-US" dirty="0"/>
+          </a:p>
+        </p:txBody>
+      </p:sp>
+      <mc:AlternateContent xmlns:mc="http://schemas.openxmlformats.org/markup-compatibility/2006" xmlns:a14="http://schemas.microsoft.com/office/drawing/2010/main">
+        <mc:Choice Requires="a14">
+          <p:sp>
+            <p:nvSpPr>
+              <p:cNvPr id="15" name="TextBox 14">
+                <a:extLst>
+                  <a:ext uri="{FF2B5EF4-FFF2-40B4-BE49-F238E27FC236}">
+                    <a16:creationId xmlns:a16="http://schemas.microsoft.com/office/drawing/2014/main" id="{E3FD57A2-3407-4DFB-9CBB-47B49CAF3DDC}"/>
+                  </a:ext>
+                </a:extLst>
+              </p:cNvPr>
+              <p:cNvSpPr txBox="1"/>
+              <p:nvPr/>
+            </p:nvSpPr>
+            <p:spPr>
+              <a:xfrm>
+                <a:off x="1727865" y="3511970"/>
+                <a:ext cx="8491172" cy="2246769"/>
+              </a:xfrm>
+              <a:prstGeom prst="rect">
+                <a:avLst/>
+              </a:prstGeom>
+              <a:noFill/>
+            </p:spPr>
+            <p:txBody>
+              <a:bodyPr wrap="square" rtlCol="0">
+                <a:spAutoFit/>
+              </a:bodyPr>
+              <a:lstStyle/>
+              <a:p>
+                <a:pPr marL="285750" indent="-285750">
+                  <a:buFont typeface="Wingdings" panose="05000000000000000000" pitchFamily="2" charset="2"/>
+                  <a:buChar char="§"/>
+                </a:pPr>
+                <a:r>
+                  <a:rPr lang="en-US" sz="2000" dirty="0"/>
+                  <a:t>The reward takes two discrete values : 0 and 1</a:t>
+                </a:r>
+              </a:p>
+              <a:p>
+                <a:pPr marL="285750" indent="-285750">
+                  <a:buFont typeface="Wingdings" panose="05000000000000000000" pitchFamily="2" charset="2"/>
+                  <a:buChar char="§"/>
+                </a:pPr>
+                <a:endParaRPr lang="en-US" sz="2000" dirty="0"/>
+              </a:p>
+              <a:p>
+                <a:pPr marL="285750" indent="-285750">
+                  <a:buFont typeface="Wingdings" panose="05000000000000000000" pitchFamily="2" charset="2"/>
+                  <a:buChar char="§"/>
+                </a:pPr>
+                <a:r>
+                  <a:rPr lang="en-US" sz="2000" dirty="0"/>
+                  <a:t>Assume that the reward follows a Bernoulli distribution</a:t>
+                </a:r>
+              </a:p>
+              <a:p>
+                <a:pPr marL="285750" indent="-285750">
+                  <a:buFont typeface="Wingdings" panose="05000000000000000000" pitchFamily="2" charset="2"/>
+                  <a:buChar char="§"/>
+                </a:pPr>
+                <a:endParaRPr lang="en-US" sz="2000" dirty="0"/>
+              </a:p>
+              <a:p>
+                <a:pPr/>
+                <a14:m>
+                  <m:oMathPara xmlns:m="http://schemas.openxmlformats.org/officeDocument/2006/math">
+                    <m:oMathParaPr>
+                      <m:jc m:val="centerGroup"/>
+                    </m:oMathParaPr>
+                    <m:oMath xmlns:m="http://schemas.openxmlformats.org/officeDocument/2006/math">
+                      <m:func>
+                        <m:funcPr>
+                          <m:ctrlPr>
+                            <a:rPr lang="en-US" sz="2000" b="0" i="1" smtClean="0">
+                              <a:latin typeface="Cambria Math" panose="02040503050406030204" pitchFamily="18" charset="0"/>
+                            </a:rPr>
+                          </m:ctrlPr>
+                        </m:funcPr>
+                        <m:fName>
+                          <m:r>
+                            <m:rPr>
+                              <m:sty m:val="p"/>
+                            </m:rPr>
+                            <a:rPr lang="en-US" sz="2000" b="0" i="0" smtClean="0">
+                              <a:latin typeface="Cambria Math" panose="02040503050406030204" pitchFamily="18" charset="0"/>
+                            </a:rPr>
+                            <m:t>Pr</m:t>
+                          </m:r>
+                        </m:fName>
+                        <m:e>
+                          <m:d>
+                            <m:dPr>
+                              <m:ctrlPr>
+                                <a:rPr lang="en-US" sz="2000" b="0" i="1" smtClean="0">
+                                  <a:latin typeface="Cambria Math" panose="02040503050406030204" pitchFamily="18" charset="0"/>
+                                </a:rPr>
+                              </m:ctrlPr>
+                            </m:dPr>
+                            <m:e>
+                              <m:r>
+                                <a:rPr lang="en-US" sz="2000" b="0" i="1" smtClean="0">
+                                  <a:latin typeface="Cambria Math" panose="02040503050406030204" pitchFamily="18" charset="0"/>
+                                </a:rPr>
+                                <m:t>𝑟</m:t>
+                              </m:r>
+                              <m:r>
+                                <a:rPr lang="en-US" sz="2000" b="0" i="1" smtClean="0">
+                                  <a:latin typeface="Cambria Math" panose="02040503050406030204" pitchFamily="18" charset="0"/>
+                                </a:rPr>
+                                <m:t>|</m:t>
+                              </m:r>
+                              <m:r>
+                                <a:rPr lang="en-US" sz="2000" b="0" i="1" smtClean="0">
+                                  <a:latin typeface="Cambria Math" panose="02040503050406030204" pitchFamily="18" charset="0"/>
+                                </a:rPr>
+                                <m:t>𝜃</m:t>
+                              </m:r>
+                            </m:e>
+                          </m:d>
+                        </m:e>
+                      </m:func>
+                      <m:r>
+                        <a:rPr lang="en-US" sz="2000" b="0" i="1" smtClean="0">
+                          <a:latin typeface="Cambria Math" panose="02040503050406030204" pitchFamily="18" charset="0"/>
+                        </a:rPr>
+                        <m:t>=</m:t>
+                      </m:r>
+                      <m:sSup>
+                        <m:sSupPr>
+                          <m:ctrlPr>
+                            <a:rPr lang="en-US" sz="2000" b="0" i="1" smtClean="0">
+                              <a:latin typeface="Cambria Math" panose="02040503050406030204" pitchFamily="18" charset="0"/>
+                            </a:rPr>
+                          </m:ctrlPr>
+                        </m:sSupPr>
+                        <m:e>
+                          <m:r>
+                            <a:rPr lang="en-US" sz="2000" b="0" i="1" smtClean="0">
+                              <a:latin typeface="Cambria Math" panose="02040503050406030204" pitchFamily="18" charset="0"/>
+                            </a:rPr>
+                            <m:t>𝜃</m:t>
+                          </m:r>
+                        </m:e>
+                        <m:sup>
+                          <m:r>
+                            <a:rPr lang="en-US" sz="2000" b="0" i="1" smtClean="0">
+                              <a:latin typeface="Cambria Math" panose="02040503050406030204" pitchFamily="18" charset="0"/>
+                            </a:rPr>
+                            <m:t>𝑟</m:t>
+                          </m:r>
+                        </m:sup>
+                      </m:sSup>
+                      <m:sSup>
+                        <m:sSupPr>
+                          <m:ctrlPr>
+                            <a:rPr lang="en-US" sz="2000" b="0" i="1" smtClean="0">
+                              <a:latin typeface="Cambria Math" panose="02040503050406030204" pitchFamily="18" charset="0"/>
+                            </a:rPr>
+                          </m:ctrlPr>
+                        </m:sSupPr>
+                        <m:e>
+                          <m:d>
+                            <m:dPr>
+                              <m:ctrlPr>
+                                <a:rPr lang="en-US" sz="2000" b="0" i="1" smtClean="0">
+                                  <a:latin typeface="Cambria Math" panose="02040503050406030204" pitchFamily="18" charset="0"/>
+                                </a:rPr>
+                              </m:ctrlPr>
+                            </m:dPr>
+                            <m:e>
+                              <m:r>
+                                <a:rPr lang="en-US" sz="2000" b="0" i="1" smtClean="0">
+                                  <a:latin typeface="Cambria Math" panose="02040503050406030204" pitchFamily="18" charset="0"/>
+                                </a:rPr>
+                                <m:t>1−</m:t>
+                              </m:r>
+                              <m:r>
+                                <a:rPr lang="en-US" sz="2000" b="0" i="1" smtClean="0">
+                                  <a:latin typeface="Cambria Math" panose="02040503050406030204" pitchFamily="18" charset="0"/>
+                                </a:rPr>
+                                <m:t>𝜃</m:t>
+                              </m:r>
+                            </m:e>
+                          </m:d>
+                        </m:e>
+                        <m:sup>
+                          <m:r>
+                            <a:rPr lang="en-US" sz="2000" b="0" i="1" smtClean="0">
+                              <a:latin typeface="Cambria Math" panose="02040503050406030204" pitchFamily="18" charset="0"/>
+                            </a:rPr>
+                            <m:t>1−</m:t>
+                          </m:r>
+                          <m:r>
+                            <a:rPr lang="en-US" sz="2000" b="0" i="1" smtClean="0">
+                              <a:latin typeface="Cambria Math" panose="02040503050406030204" pitchFamily="18" charset="0"/>
+                            </a:rPr>
+                            <m:t>𝑟</m:t>
+                          </m:r>
+                        </m:sup>
+                      </m:sSup>
+                      <m:r>
+                        <a:rPr lang="en-US" sz="2000" b="0" i="1" smtClean="0">
+                          <a:latin typeface="Cambria Math" panose="02040503050406030204" pitchFamily="18" charset="0"/>
+                        </a:rPr>
+                        <m:t>,  </m:t>
+                      </m:r>
+                      <m:r>
+                        <a:rPr lang="en-US" sz="2000" b="0" i="1" smtClean="0">
+                          <a:latin typeface="Cambria Math" panose="02040503050406030204" pitchFamily="18" charset="0"/>
+                        </a:rPr>
+                        <m:t>𝑟</m:t>
+                      </m:r>
+                      <m:r>
+                        <a:rPr lang="en-US" sz="2000" b="0" i="1" smtClean="0">
+                          <a:latin typeface="Cambria Math" panose="02040503050406030204" pitchFamily="18" charset="0"/>
+                        </a:rPr>
+                        <m:t>∈</m:t>
+                      </m:r>
+                      <m:d>
+                        <m:dPr>
+                          <m:begChr m:val="{"/>
+                          <m:endChr m:val="}"/>
+                          <m:ctrlPr>
+                            <a:rPr lang="en-US" sz="2000" b="0" i="1" smtClean="0">
+                              <a:latin typeface="Cambria Math" panose="02040503050406030204" pitchFamily="18" charset="0"/>
+                            </a:rPr>
+                          </m:ctrlPr>
+                        </m:dPr>
+                        <m:e>
+                          <m:r>
+                            <a:rPr lang="en-US" sz="2000" b="0" i="1" smtClean="0">
+                              <a:latin typeface="Cambria Math" panose="02040503050406030204" pitchFamily="18" charset="0"/>
+                            </a:rPr>
+                            <m:t>0,1</m:t>
+                          </m:r>
+                        </m:e>
+                      </m:d>
+                    </m:oMath>
+                  </m:oMathPara>
+                </a14:m>
+                <a:endParaRPr lang="en-US" sz="2000" dirty="0"/>
+              </a:p>
+              <a:p>
+                <a:endParaRPr lang="en-US" sz="2000" dirty="0"/>
+              </a:p>
+              <a:p>
+                <a:r>
+                  <a:rPr lang="en-US" sz="2000" dirty="0"/>
+                  <a:t>  </a:t>
+                </a:r>
+              </a:p>
+            </p:txBody>
+          </p:sp>
+        </mc:Choice>
+        <mc:Fallback xmlns="">
+          <p:sp>
+            <p:nvSpPr>
+              <p:cNvPr id="15" name="TextBox 14">
+                <a:extLst>
+                  <a:ext uri="{FF2B5EF4-FFF2-40B4-BE49-F238E27FC236}">
+                    <a16:creationId xmlns:a16="http://schemas.microsoft.com/office/drawing/2014/main" id="{E3FD57A2-3407-4DFB-9CBB-47B49CAF3DDC}"/>
+                  </a:ext>
+                </a:extLst>
+              </p:cNvPr>
+              <p:cNvSpPr txBox="1">
+                <a:spLocks noRot="1" noChangeAspect="1" noMove="1" noResize="1" noEditPoints="1" noAdjustHandles="1" noChangeArrowheads="1" noChangeShapeType="1" noTextEdit="1"/>
+              </p:cNvSpPr>
+              <p:nvPr/>
+            </p:nvSpPr>
+            <p:spPr>
+              <a:xfrm>
+                <a:off x="1727865" y="3511970"/>
+                <a:ext cx="8491172" cy="2246769"/>
+              </a:xfrm>
+              <a:prstGeom prst="rect">
+                <a:avLst/>
+              </a:prstGeom>
+              <a:blipFill>
+                <a:blip r:embed="rId4"/>
+                <a:stretch>
+                  <a:fillRect l="-646" t="-1355"/>
+                </a:stretch>
+              </a:blipFill>
+            </p:spPr>
+            <p:txBody>
+              <a:bodyPr/>
+              <a:lstStyle/>
+              <a:p>
+                <a:r>
+                  <a:rPr lang="en-US">
+                    <a:noFill/>
+                  </a:rPr>
+                  <a:t> </a:t>
+                </a:r>
+              </a:p>
+            </p:txBody>
+          </p:sp>
+        </mc:Fallback>
+      </mc:AlternateContent>
     </p:spTree>
     <p:extLst>
       <p:ext uri="{BB962C8B-B14F-4D97-AF65-F5344CB8AC3E}">
-        <p14:creationId xmlns:p14="http://schemas.microsoft.com/office/powerpoint/2010/main" val="3016005494"/>
+        <p14:creationId xmlns:p14="http://schemas.microsoft.com/office/powerpoint/2010/main" val="1287553037"/>
       </p:ext>
     </p:extLst>
   </p:cSld>

</xml_diff>